<commit_message>
update ppt, script and code slides
</commit_message>
<xml_diff>
--- a/presentation/SPA_workshop.pptx
+++ b/presentation/SPA_workshop.pptx
@@ -5,32 +5,34 @@
     <p:sldMasterId id="2147483648" r:id="rId1"/>
   </p:sldMasterIdLst>
   <p:notesMasterIdLst>
-    <p:notesMasterId r:id="rId25"/>
+    <p:notesMasterId r:id="rId27"/>
   </p:notesMasterIdLst>
   <p:sldIdLst>
     <p:sldId id="256" r:id="rId2"/>
     <p:sldId id="302" r:id="rId3"/>
     <p:sldId id="303" r:id="rId4"/>
-    <p:sldId id="323" r:id="rId5"/>
-    <p:sldId id="304" r:id="rId6"/>
-    <p:sldId id="305" r:id="rId7"/>
-    <p:sldId id="348" r:id="rId8"/>
-    <p:sldId id="306" r:id="rId9"/>
-    <p:sldId id="307" r:id="rId10"/>
-    <p:sldId id="325" r:id="rId11"/>
-    <p:sldId id="331" r:id="rId12"/>
-    <p:sldId id="326" r:id="rId13"/>
-    <p:sldId id="327" r:id="rId14"/>
-    <p:sldId id="328" r:id="rId15"/>
-    <p:sldId id="329" r:id="rId16"/>
-    <p:sldId id="347" r:id="rId17"/>
-    <p:sldId id="330" r:id="rId18"/>
-    <p:sldId id="308" r:id="rId19"/>
-    <p:sldId id="338" r:id="rId20"/>
-    <p:sldId id="349" r:id="rId21"/>
-    <p:sldId id="345" r:id="rId22"/>
-    <p:sldId id="346" r:id="rId23"/>
-    <p:sldId id="321" r:id="rId24"/>
+    <p:sldId id="351" r:id="rId5"/>
+    <p:sldId id="323" r:id="rId6"/>
+    <p:sldId id="304" r:id="rId7"/>
+    <p:sldId id="350" r:id="rId8"/>
+    <p:sldId id="305" r:id="rId9"/>
+    <p:sldId id="348" r:id="rId10"/>
+    <p:sldId id="306" r:id="rId11"/>
+    <p:sldId id="307" r:id="rId12"/>
+    <p:sldId id="325" r:id="rId13"/>
+    <p:sldId id="331" r:id="rId14"/>
+    <p:sldId id="326" r:id="rId15"/>
+    <p:sldId id="327" r:id="rId16"/>
+    <p:sldId id="328" r:id="rId17"/>
+    <p:sldId id="329" r:id="rId18"/>
+    <p:sldId id="347" r:id="rId19"/>
+    <p:sldId id="330" r:id="rId20"/>
+    <p:sldId id="308" r:id="rId21"/>
+    <p:sldId id="338" r:id="rId22"/>
+    <p:sldId id="349" r:id="rId23"/>
+    <p:sldId id="345" r:id="rId24"/>
+    <p:sldId id="346" r:id="rId25"/>
+    <p:sldId id="321" r:id="rId26"/>
   </p:sldIdLst>
   <p:sldSz cx="9144000" cy="6858000" type="screen4x3"/>
   <p:notesSz cx="7010400" cy="9296400"/>
@@ -131,7 +133,7 @@
   </p:defaultTextStyle>
   <p:extLst>
     <p:ext uri="{EFAFB233-063F-42B5-8137-9DF3F51BA10A}">
-      <p15:sldGuideLst xmlns:p15="http://schemas.microsoft.com/office/powerpoint/2012/main" xmlns="">
+      <p15:sldGuideLst xmlns="" xmlns:p15="http://schemas.microsoft.com/office/powerpoint/2012/main">
         <p15:guide id="1" orient="horz" pos="2832">
           <p15:clr>
             <a:srgbClr val="A4A3A4"/>
@@ -145,7 +147,7 @@
       </p15:sldGuideLst>
     </p:ext>
     <p:ext uri="{2D200454-40CA-4A62-9FC3-DE9A4176ACB9}">
-      <p15:notesGuideLst xmlns:p15="http://schemas.microsoft.com/office/powerpoint/2012/main" xmlns="">
+      <p15:notesGuideLst xmlns="" xmlns:p15="http://schemas.microsoft.com/office/powerpoint/2012/main">
         <p15:guide id="1" orient="horz" pos="2928">
           <p15:clr>
             <a:srgbClr val="A4A3A4"/>
@@ -769,7 +771,7 @@
           <a:p>
             <a:fld id="{6E7BCF8E-0148-4640-9831-34E5DCA3DA5C}" type="datetimeFigureOut">
               <a:rPr lang="en-US" smtClean="0"/>
-              <a:t>1/17/2014</a:t>
+              <a:t>1/20/2014</a:t>
             </a:fld>
             <a:endParaRPr lang="en-US"/>
           </a:p>
@@ -1082,9 +1084,705 @@
           <a:lstStyle/>
           <a:p>
             <a:r>
-              <a:rPr lang="en-US" dirty="0" smtClean="0"/>
-              <a:t>There is another graphic you can show.</a:t>
-            </a:r>
+              <a:rPr lang="en-US" sz="1200" i="1" kern="1200" dirty="0" smtClean="0">
+                <a:solidFill>
+                  <a:schemeClr val="tx1"/>
+                </a:solidFill>
+                <a:effectLst/>
+                <a:latin typeface="+mn-lt"/>
+                <a:ea typeface="+mn-ea"/>
+                <a:cs typeface="+mn-cs"/>
+              </a:rPr>
+              <a:t>This is the introduction and uses the first 4 slides. There isn’t any scripted content for this section, as you just expand on the slides.</a:t>
+            </a:r>
+            <a:endParaRPr lang="en-US" sz="1200" kern="1200" dirty="0" smtClean="0">
+              <a:solidFill>
+                <a:schemeClr val="tx1"/>
+              </a:solidFill>
+              <a:effectLst/>
+              <a:latin typeface="+mn-lt"/>
+              <a:ea typeface="+mn-ea"/>
+              <a:cs typeface="+mn-cs"/>
+            </a:endParaRPr>
+          </a:p>
+          <a:p>
+            <a:r>
+              <a:rPr lang="en-US" sz="1200" kern="1200" dirty="0" smtClean="0">
+                <a:solidFill>
+                  <a:schemeClr val="tx1"/>
+                </a:solidFill>
+                <a:effectLst/>
+                <a:latin typeface="+mn-lt"/>
+                <a:ea typeface="+mn-ea"/>
+                <a:cs typeface="+mn-cs"/>
+              </a:rPr>
+              <a:t>[Slides 1,2,3,4 -&gt; Intro material ]</a:t>
+            </a:r>
+          </a:p>
+          <a:p>
+            <a:r>
+              <a:rPr lang="en-US" sz="1200" b="1" kern="1200" dirty="0" smtClean="0">
+                <a:solidFill>
+                  <a:schemeClr val="tx1"/>
+                </a:solidFill>
+                <a:effectLst/>
+                <a:latin typeface="+mn-lt"/>
+                <a:ea typeface="+mn-ea"/>
+                <a:cs typeface="+mn-cs"/>
+              </a:rPr>
+              <a:t>Comparison of SPA Vs. Traditional Web Applications</a:t>
+            </a:r>
+            <a:endParaRPr lang="en-US" sz="1200" kern="1200" dirty="0" smtClean="0">
+              <a:solidFill>
+                <a:schemeClr val="tx1"/>
+              </a:solidFill>
+              <a:effectLst/>
+              <a:latin typeface="+mn-lt"/>
+              <a:ea typeface="+mn-ea"/>
+              <a:cs typeface="+mn-cs"/>
+            </a:endParaRPr>
+          </a:p>
+          <a:p>
+            <a:r>
+              <a:rPr lang="en-US" sz="1200" i="1" kern="1200" dirty="0" smtClean="0">
+                <a:solidFill>
+                  <a:schemeClr val="tx1"/>
+                </a:solidFill>
+                <a:effectLst/>
+                <a:latin typeface="+mn-lt"/>
+                <a:ea typeface="+mn-ea"/>
+                <a:cs typeface="+mn-cs"/>
+              </a:rPr>
+              <a:t>This is the framework introduction and uses slides 5 through 17. You should be familiar with the text below which is the information to talk about over these slides. Slide position is mentioned where possible.</a:t>
+            </a:r>
+            <a:endParaRPr lang="en-US" sz="1200" kern="1200" dirty="0" smtClean="0">
+              <a:solidFill>
+                <a:schemeClr val="tx1"/>
+              </a:solidFill>
+              <a:effectLst/>
+              <a:latin typeface="+mn-lt"/>
+              <a:ea typeface="+mn-ea"/>
+              <a:cs typeface="+mn-cs"/>
+            </a:endParaRPr>
+          </a:p>
+          <a:p>
+            <a:r>
+              <a:rPr lang="en-US" sz="1200" kern="1200" dirty="0" smtClean="0">
+                <a:solidFill>
+                  <a:schemeClr val="tx1"/>
+                </a:solidFill>
+                <a:effectLst/>
+                <a:latin typeface="+mn-lt"/>
+                <a:ea typeface="+mn-ea"/>
+                <a:cs typeface="+mn-cs"/>
+              </a:rPr>
+              <a:t>[Slides 5,6,7 -&gt; Variance in composing pages / page layout ]</a:t>
+            </a:r>
+          </a:p>
+          <a:p>
+            <a:r>
+              <a:rPr lang="en-US" sz="1200" kern="1200" dirty="0" smtClean="0">
+                <a:solidFill>
+                  <a:schemeClr val="tx1"/>
+                </a:solidFill>
+                <a:effectLst/>
+                <a:latin typeface="+mn-lt"/>
+                <a:ea typeface="+mn-ea"/>
+                <a:cs typeface="+mn-cs"/>
+              </a:rPr>
+              <a:t>There have been various methods over the years for composing pages. There are very traditional includes, such as in PHP, ASP, etc.</a:t>
+            </a:r>
+          </a:p>
+          <a:p>
+            <a:r>
+              <a:rPr lang="en-US" sz="1200" kern="1200" dirty="0" smtClean="0">
+                <a:solidFill>
+                  <a:schemeClr val="tx1"/>
+                </a:solidFill>
+                <a:effectLst/>
+                <a:latin typeface="+mn-lt"/>
+                <a:ea typeface="+mn-ea"/>
+                <a:cs typeface="+mn-cs"/>
+              </a:rPr>
+              <a:t>In the J2EE world there has been JSTL for includes, and libraries like Tiles for composing pages.</a:t>
+            </a:r>
+          </a:p>
+          <a:p>
+            <a:r>
+              <a:rPr lang="en-US" sz="1200" kern="1200" dirty="0" smtClean="0">
+                <a:solidFill>
+                  <a:schemeClr val="tx1"/>
+                </a:solidFill>
+                <a:effectLst/>
+                <a:latin typeface="+mn-lt"/>
+                <a:ea typeface="+mn-ea"/>
+                <a:cs typeface="+mn-cs"/>
+              </a:rPr>
+              <a:t>Even before all of this, designers and developers were using frames to try and avoid rebuilding the entire page.</a:t>
+            </a:r>
+          </a:p>
+          <a:p>
+            <a:r>
+              <a:rPr lang="en-US" sz="1200" kern="1200" dirty="0" smtClean="0">
+                <a:solidFill>
+                  <a:schemeClr val="tx1"/>
+                </a:solidFill>
+                <a:effectLst/>
+                <a:latin typeface="+mn-lt"/>
+                <a:ea typeface="+mn-ea"/>
+                <a:cs typeface="+mn-cs"/>
+              </a:rPr>
+              <a:t>With an SPA, even when a template engine isn’t used, the entire page is rendered once, and from there only the portions of the page concerned with what is changing are updated. Users spend an increasing amount of time interacting with an application before it has to go back to the server. The blink of the page render is gone and replaced by progress bars or animations.</a:t>
+            </a:r>
+          </a:p>
+          <a:p>
+            <a:r>
+              <a:rPr lang="en-US" sz="1200" kern="1200" dirty="0" smtClean="0">
+                <a:solidFill>
+                  <a:schemeClr val="tx1"/>
+                </a:solidFill>
+                <a:effectLst/>
+                <a:latin typeface="+mn-lt"/>
+                <a:ea typeface="+mn-ea"/>
+                <a:cs typeface="+mn-cs"/>
+              </a:rPr>
+              <a:t>Responsibility also changes. The server can now focus on areas like services and security. Server side developers can focus on data storage and service interfaces without knowing anything about the look, feel or even design of the front end. Services can be designed to be a mix of public and private APIs. </a:t>
+            </a:r>
+          </a:p>
+          <a:p>
+            <a:r>
+              <a:rPr lang="en-US" sz="1200" kern="1200" dirty="0" smtClean="0">
+                <a:solidFill>
+                  <a:schemeClr val="tx1"/>
+                </a:solidFill>
+                <a:effectLst/>
+                <a:latin typeface="+mn-lt"/>
+                <a:ea typeface="+mn-ea"/>
+                <a:cs typeface="+mn-cs"/>
+              </a:rPr>
+              <a:t>On the front end, the responsibility for page composition is taken on, as well as routing logic and some business logic. It should be noted here that what doesn’t change, is the need to validate all data arriving at the server. Do not calculate the shopping cart total on the front end and then trust the value </a:t>
+            </a:r>
+            <a:r>
+              <a:rPr lang="en-US" sz="1200" kern="1200" dirty="0" smtClean="0">
+                <a:solidFill>
+                  <a:schemeClr val="tx1"/>
+                </a:solidFill>
+                <a:effectLst/>
+                <a:latin typeface="+mn-lt"/>
+                <a:ea typeface="+mn-ea"/>
+                <a:cs typeface="+mn-cs"/>
+                <a:sym typeface="Wingdings"/>
+              </a:rPr>
+              <a:t></a:t>
+            </a:r>
+            <a:r>
+              <a:rPr lang="en-US" sz="1200" kern="1200" dirty="0" smtClean="0">
+                <a:solidFill>
+                  <a:schemeClr val="tx1"/>
+                </a:solidFill>
+                <a:effectLst/>
+                <a:latin typeface="+mn-lt"/>
+                <a:ea typeface="+mn-ea"/>
+                <a:cs typeface="+mn-cs"/>
+              </a:rPr>
+              <a:t>.</a:t>
+            </a:r>
+          </a:p>
+          <a:p>
+            <a:r>
+              <a:rPr lang="en-US" sz="1200" kern="1200" dirty="0" smtClean="0">
+                <a:solidFill>
+                  <a:schemeClr val="tx1"/>
+                </a:solidFill>
+                <a:effectLst/>
+                <a:latin typeface="+mn-lt"/>
+                <a:ea typeface="+mn-ea"/>
+                <a:cs typeface="+mn-cs"/>
+              </a:rPr>
+              <a:t>For developers, there is much more clarity of role. Work can be more easily divided into roles; with developers work on the server, look &amp; feel, and front end application logic.</a:t>
+            </a:r>
+          </a:p>
+          <a:p>
+            <a:r>
+              <a:rPr lang="en-US" sz="1200" b="1" kern="1200" dirty="0" smtClean="0">
+                <a:solidFill>
+                  <a:schemeClr val="tx1"/>
+                </a:solidFill>
+                <a:effectLst/>
+                <a:latin typeface="+mn-lt"/>
+                <a:ea typeface="+mn-ea"/>
+                <a:cs typeface="+mn-cs"/>
+              </a:rPr>
+              <a:t>Framework Tour and Comparison</a:t>
+            </a:r>
+            <a:endParaRPr lang="en-US" sz="1200" kern="1200" dirty="0" smtClean="0">
+              <a:solidFill>
+                <a:schemeClr val="tx1"/>
+              </a:solidFill>
+              <a:effectLst/>
+              <a:latin typeface="+mn-lt"/>
+              <a:ea typeface="+mn-ea"/>
+              <a:cs typeface="+mn-cs"/>
+            </a:endParaRPr>
+          </a:p>
+          <a:p>
+            <a:r>
+              <a:rPr lang="en-US" sz="1200" i="1" kern="1200" dirty="0" smtClean="0">
+                <a:solidFill>
+                  <a:schemeClr val="tx1"/>
+                </a:solidFill>
+                <a:effectLst/>
+                <a:latin typeface="+mn-lt"/>
+                <a:ea typeface="+mn-ea"/>
+                <a:cs typeface="+mn-cs"/>
+              </a:rPr>
+              <a:t>Compare the frameworks based on their usage and features, then give a deeper overview of each framework.</a:t>
+            </a:r>
+            <a:endParaRPr lang="en-US" sz="1200" kern="1200" dirty="0" smtClean="0">
+              <a:solidFill>
+                <a:schemeClr val="tx1"/>
+              </a:solidFill>
+              <a:effectLst/>
+              <a:latin typeface="+mn-lt"/>
+              <a:ea typeface="+mn-ea"/>
+              <a:cs typeface="+mn-cs"/>
+            </a:endParaRPr>
+          </a:p>
+          <a:p>
+            <a:r>
+              <a:rPr lang="en-US" sz="1200" kern="1200" dirty="0" smtClean="0">
+                <a:solidFill>
+                  <a:schemeClr val="tx1"/>
+                </a:solidFill>
+                <a:effectLst/>
+                <a:latin typeface="+mn-lt"/>
+                <a:ea typeface="+mn-ea"/>
+                <a:cs typeface="+mn-cs"/>
+              </a:rPr>
+              <a:t>[Slides 8,9,10,11 -&gt; Basics framework comparison]</a:t>
+            </a:r>
+          </a:p>
+          <a:p>
+            <a:r>
+              <a:rPr lang="en-US" sz="1200" kern="1200" dirty="0" smtClean="0">
+                <a:solidFill>
+                  <a:schemeClr val="tx1"/>
+                </a:solidFill>
+                <a:effectLst/>
+                <a:latin typeface="+mn-lt"/>
+                <a:ea typeface="+mn-ea"/>
+                <a:cs typeface="+mn-cs"/>
+              </a:rPr>
+              <a:t>There are a growing number of frameworks for developing client based applications, whether “SPA” style or not. We’re going to look at a couple of them and talk about their popularity, differences and finish with some warnings about relying too heavily on these frameworks.</a:t>
+            </a:r>
+          </a:p>
+          <a:p>
+            <a:r>
+              <a:rPr lang="en-US" sz="1200" kern="1200" dirty="0" smtClean="0">
+                <a:solidFill>
+                  <a:schemeClr val="tx1"/>
+                </a:solidFill>
+                <a:effectLst/>
+                <a:latin typeface="+mn-lt"/>
+                <a:ea typeface="+mn-ea"/>
+                <a:cs typeface="+mn-cs"/>
+              </a:rPr>
+              <a:t>All of these frameworks work to provide a structured MVC/MV* pattern for building applications. Each usually provides more or less features with the trade being control of implementation and architecture or ease of use in the basic case.</a:t>
+            </a:r>
+          </a:p>
+          <a:p>
+            <a:r>
+              <a:rPr lang="en-US" sz="1200" kern="1200" dirty="0" smtClean="0">
+                <a:solidFill>
+                  <a:schemeClr val="tx1"/>
+                </a:solidFill>
+                <a:effectLst/>
+                <a:latin typeface="+mn-lt"/>
+                <a:ea typeface="+mn-ea"/>
+                <a:cs typeface="+mn-cs"/>
+              </a:rPr>
+              <a:t>Market Share </a:t>
+            </a:r>
+            <a:r>
+              <a:rPr lang="en-US" sz="1200" b="1" kern="1200" dirty="0" smtClean="0">
+                <a:solidFill>
+                  <a:schemeClr val="tx1"/>
+                </a:solidFill>
+                <a:effectLst/>
+                <a:latin typeface="+mn-lt"/>
+                <a:ea typeface="+mn-ea"/>
+                <a:cs typeface="+mn-cs"/>
+              </a:rPr>
+              <a:t>@TODO</a:t>
+            </a:r>
+            <a:endParaRPr lang="en-US" sz="1200" kern="1200" dirty="0" smtClean="0">
+              <a:solidFill>
+                <a:schemeClr val="tx1"/>
+              </a:solidFill>
+              <a:effectLst/>
+              <a:latin typeface="+mn-lt"/>
+              <a:ea typeface="+mn-ea"/>
+              <a:cs typeface="+mn-cs"/>
+            </a:endParaRPr>
+          </a:p>
+          <a:p>
+            <a:r>
+              <a:rPr lang="en-US" sz="1200" kern="1200" dirty="0" smtClean="0">
+                <a:solidFill>
+                  <a:schemeClr val="tx1"/>
+                </a:solidFill>
+                <a:effectLst/>
+                <a:latin typeface="+mn-lt"/>
+                <a:ea typeface="+mn-ea"/>
+                <a:cs typeface="+mn-cs"/>
+              </a:rPr>
+              <a:t>Trends and other Info </a:t>
+            </a:r>
+            <a:r>
+              <a:rPr lang="en-US" sz="1200" b="1" kern="1200" dirty="0" smtClean="0">
+                <a:solidFill>
+                  <a:schemeClr val="tx1"/>
+                </a:solidFill>
+                <a:effectLst/>
+                <a:latin typeface="+mn-lt"/>
+                <a:ea typeface="+mn-ea"/>
+                <a:cs typeface="+mn-cs"/>
+              </a:rPr>
+              <a:t>@TODO</a:t>
+            </a:r>
+            <a:endParaRPr lang="en-US" sz="1200" kern="1200" dirty="0" smtClean="0">
+              <a:solidFill>
+                <a:schemeClr val="tx1"/>
+              </a:solidFill>
+              <a:effectLst/>
+              <a:latin typeface="+mn-lt"/>
+              <a:ea typeface="+mn-ea"/>
+              <a:cs typeface="+mn-cs"/>
+            </a:endParaRPr>
+          </a:p>
+          <a:p>
+            <a:r>
+              <a:rPr lang="en-US" sz="1200" b="1" kern="1200" dirty="0" smtClean="0">
+                <a:solidFill>
+                  <a:schemeClr val="tx1"/>
+                </a:solidFill>
+                <a:effectLst/>
+                <a:latin typeface="+mn-lt"/>
+                <a:ea typeface="+mn-ea"/>
+                <a:cs typeface="+mn-cs"/>
+              </a:rPr>
+              <a:t>Angular.JS </a:t>
+            </a:r>
+            <a:r>
+              <a:rPr lang="en-US" sz="1200" kern="1200" dirty="0" smtClean="0">
+                <a:solidFill>
+                  <a:schemeClr val="tx1"/>
+                </a:solidFill>
+                <a:effectLst/>
+                <a:latin typeface="+mn-lt"/>
+                <a:ea typeface="+mn-ea"/>
+                <a:cs typeface="+mn-cs"/>
+              </a:rPr>
+              <a:t>[Slide 12]</a:t>
+            </a:r>
+          </a:p>
+          <a:p>
+            <a:r>
+              <a:rPr lang="en-US" sz="1200" kern="1200" dirty="0" smtClean="0">
+                <a:solidFill>
+                  <a:schemeClr val="tx1"/>
+                </a:solidFill>
+                <a:effectLst/>
+                <a:latin typeface="+mn-lt"/>
+                <a:ea typeface="+mn-ea"/>
+                <a:cs typeface="+mn-cs"/>
+              </a:rPr>
+              <a:t>Angular is a library currently supported by Google. It’s widely popular and based on adding additional markup to your html. By placing markup you give Angular instructions and information about your page.</a:t>
+            </a:r>
+          </a:p>
+          <a:p>
+            <a:r>
+              <a:rPr lang="en-US" sz="1200" kern="1200" dirty="0" smtClean="0">
+                <a:solidFill>
+                  <a:schemeClr val="tx1"/>
+                </a:solidFill>
+                <a:effectLst/>
+                <a:latin typeface="+mn-lt"/>
+                <a:ea typeface="+mn-ea"/>
+                <a:cs typeface="+mn-cs"/>
+              </a:rPr>
+              <a:t>Angular is one of the larger frameworks available, because of all the features it provides. It’s Very declarative and inspired by ideas like Silverlight, which is exemplified by the two way data binding and html markup control. Angular has no dependencies, but wants to stand on its own; so it doesn’t work well with other technologies like JQuery.</a:t>
+            </a:r>
+          </a:p>
+          <a:p>
+            <a:r>
+              <a:rPr lang="en-US" sz="1200" kern="1200" dirty="0" smtClean="0">
+                <a:solidFill>
+                  <a:schemeClr val="tx1"/>
+                </a:solidFill>
+                <a:effectLst/>
+                <a:latin typeface="+mn-lt"/>
+                <a:ea typeface="+mn-ea"/>
+                <a:cs typeface="+mn-cs"/>
+              </a:rPr>
+              <a:t>= Still more to add here =</a:t>
+            </a:r>
+          </a:p>
+          <a:p>
+            <a:r>
+              <a:rPr lang="en-US" sz="1200" b="1" kern="1200" dirty="0" smtClean="0">
+                <a:solidFill>
+                  <a:schemeClr val="tx1"/>
+                </a:solidFill>
+                <a:effectLst/>
+                <a:latin typeface="+mn-lt"/>
+                <a:ea typeface="+mn-ea"/>
+                <a:cs typeface="+mn-cs"/>
+              </a:rPr>
+              <a:t>Backbone.JS</a:t>
+            </a:r>
+            <a:r>
+              <a:rPr lang="en-US" sz="1200" kern="1200" dirty="0" smtClean="0">
+                <a:solidFill>
+                  <a:schemeClr val="tx1"/>
+                </a:solidFill>
+                <a:effectLst/>
+                <a:latin typeface="+mn-lt"/>
+                <a:ea typeface="+mn-ea"/>
+                <a:cs typeface="+mn-cs"/>
+              </a:rPr>
+              <a:t> [Slide 13]</a:t>
+            </a:r>
+          </a:p>
+          <a:p>
+            <a:r>
+              <a:rPr lang="en-US" sz="1200" kern="1200" dirty="0" smtClean="0">
+                <a:solidFill>
+                  <a:schemeClr val="tx1"/>
+                </a:solidFill>
+                <a:effectLst/>
+                <a:latin typeface="+mn-lt"/>
+                <a:ea typeface="+mn-ea"/>
+                <a:cs typeface="+mn-cs"/>
+              </a:rPr>
+              <a:t>Backbone is a small library that provides just enough structure to assist you in building small to medium sized applications. As application sizes grow, Backbone requires more and more architecture on your part.</a:t>
+            </a:r>
+          </a:p>
+          <a:p>
+            <a:r>
+              <a:rPr lang="en-US" sz="1200" kern="1200" dirty="0" smtClean="0">
+                <a:solidFill>
+                  <a:schemeClr val="tx1"/>
+                </a:solidFill>
+                <a:effectLst/>
+                <a:latin typeface="+mn-lt"/>
+                <a:ea typeface="+mn-ea"/>
+                <a:cs typeface="+mn-cs"/>
+              </a:rPr>
+              <a:t>Being one of the smallest libraries available, you get the benefit of fast review of the source code and easy handling of special cases. Backbone provides Routers as a primary controller, and is considered a MV* library.</a:t>
+            </a:r>
+          </a:p>
+          <a:p>
+            <a:r>
+              <a:rPr lang="en-US" sz="1200" kern="1200" dirty="0" smtClean="0">
+                <a:solidFill>
+                  <a:schemeClr val="tx1"/>
+                </a:solidFill>
+                <a:effectLst/>
+                <a:latin typeface="+mn-lt"/>
+                <a:ea typeface="+mn-ea"/>
+                <a:cs typeface="+mn-cs"/>
+              </a:rPr>
+              <a:t>Backbone depends on Underscore, and you will want to provide a </a:t>
+            </a:r>
+            <a:r>
+              <a:rPr lang="en-US" sz="1200" kern="1200" dirty="0" err="1" smtClean="0">
+                <a:solidFill>
+                  <a:schemeClr val="tx1"/>
+                </a:solidFill>
+                <a:effectLst/>
+                <a:latin typeface="+mn-lt"/>
+                <a:ea typeface="+mn-ea"/>
+                <a:cs typeface="+mn-cs"/>
+              </a:rPr>
+              <a:t>templating</a:t>
+            </a:r>
+            <a:r>
+              <a:rPr lang="en-US" sz="1200" kern="1200" dirty="0" smtClean="0">
+                <a:solidFill>
+                  <a:schemeClr val="tx1"/>
+                </a:solidFill>
+                <a:effectLst/>
+                <a:latin typeface="+mn-lt"/>
+                <a:ea typeface="+mn-ea"/>
+                <a:cs typeface="+mn-cs"/>
+              </a:rPr>
+              <a:t> library; usually Handlebars, Mustache or _.template.</a:t>
+            </a:r>
+          </a:p>
+          <a:p>
+            <a:r>
+              <a:rPr lang="en-US" sz="1200" b="1" kern="1200" dirty="0" smtClean="0">
+                <a:solidFill>
+                  <a:schemeClr val="tx1"/>
+                </a:solidFill>
+                <a:effectLst/>
+                <a:latin typeface="+mn-lt"/>
+                <a:ea typeface="+mn-ea"/>
+                <a:cs typeface="+mn-cs"/>
+              </a:rPr>
+              <a:t>Ember.JS</a:t>
+            </a:r>
+            <a:r>
+              <a:rPr lang="en-US" sz="1200" kern="1200" dirty="0" smtClean="0">
+                <a:solidFill>
+                  <a:schemeClr val="tx1"/>
+                </a:solidFill>
+                <a:effectLst/>
+                <a:latin typeface="+mn-lt"/>
+                <a:ea typeface="+mn-ea"/>
+                <a:cs typeface="+mn-cs"/>
+              </a:rPr>
+              <a:t> [Slide 14]</a:t>
+            </a:r>
+          </a:p>
+          <a:p>
+            <a:r>
+              <a:rPr lang="en-US" sz="1200" kern="1200" dirty="0" smtClean="0">
+                <a:solidFill>
+                  <a:schemeClr val="tx1"/>
+                </a:solidFill>
+                <a:effectLst/>
+                <a:latin typeface="+mn-lt"/>
+                <a:ea typeface="+mn-ea"/>
+                <a:cs typeface="+mn-cs"/>
+              </a:rPr>
+              <a:t>@TODO</a:t>
+            </a:r>
+          </a:p>
+          <a:p>
+            <a:r>
+              <a:rPr lang="en-US" sz="1200" b="1" kern="1200" dirty="0" smtClean="0">
+                <a:solidFill>
+                  <a:schemeClr val="tx1"/>
+                </a:solidFill>
+                <a:effectLst/>
+                <a:latin typeface="+mn-lt"/>
+                <a:ea typeface="+mn-ea"/>
+                <a:cs typeface="+mn-cs"/>
+              </a:rPr>
+              <a:t>Knockout.JS</a:t>
+            </a:r>
+            <a:r>
+              <a:rPr lang="en-US" sz="1200" kern="1200" dirty="0" smtClean="0">
+                <a:solidFill>
+                  <a:schemeClr val="tx1"/>
+                </a:solidFill>
+                <a:effectLst/>
+                <a:latin typeface="+mn-lt"/>
+                <a:ea typeface="+mn-ea"/>
+                <a:cs typeface="+mn-cs"/>
+              </a:rPr>
+              <a:t> [Slide 15]</a:t>
+            </a:r>
+          </a:p>
+          <a:p>
+            <a:r>
+              <a:rPr lang="en-US" sz="1200" kern="1200" dirty="0" smtClean="0">
+                <a:solidFill>
+                  <a:schemeClr val="tx1"/>
+                </a:solidFill>
+                <a:effectLst/>
+                <a:latin typeface="+mn-lt"/>
+                <a:ea typeface="+mn-ea"/>
+                <a:cs typeface="+mn-cs"/>
+              </a:rPr>
+              <a:t>@TODO</a:t>
+            </a:r>
+          </a:p>
+          <a:p>
+            <a:r>
+              <a:rPr lang="en-US" sz="1200" b="1" kern="1200" dirty="0" smtClean="0">
+                <a:solidFill>
+                  <a:schemeClr val="tx1"/>
+                </a:solidFill>
+                <a:effectLst/>
+                <a:latin typeface="+mn-lt"/>
+                <a:ea typeface="+mn-ea"/>
+                <a:cs typeface="+mn-cs"/>
+              </a:rPr>
+              <a:t>Data Binding and Conclusion</a:t>
+            </a:r>
+            <a:r>
+              <a:rPr lang="en-US" sz="1200" kern="1200" dirty="0" smtClean="0">
+                <a:solidFill>
+                  <a:schemeClr val="tx1"/>
+                </a:solidFill>
+                <a:effectLst/>
+                <a:latin typeface="+mn-lt"/>
+                <a:ea typeface="+mn-ea"/>
+                <a:cs typeface="+mn-cs"/>
+              </a:rPr>
+              <a:t> [Slide 16, 17]</a:t>
+            </a:r>
+          </a:p>
+          <a:p>
+            <a:r>
+              <a:rPr lang="en-US" sz="1200" kern="1200" dirty="0" smtClean="0">
+                <a:solidFill>
+                  <a:schemeClr val="tx1"/>
+                </a:solidFill>
+                <a:effectLst/>
+                <a:latin typeface="+mn-lt"/>
+                <a:ea typeface="+mn-ea"/>
+                <a:cs typeface="+mn-cs"/>
+              </a:rPr>
+              <a:t>One of the differentiating factors with framework and libraries is the amount of binding they offer. Developers are split on this idea. Some think the inclusion of binding is a necessity, and others feel that binding depends on the project needs.</a:t>
+            </a:r>
+          </a:p>
+          <a:p>
+            <a:r>
+              <a:rPr lang="en-US" sz="1200" kern="1200" dirty="0" smtClean="0">
+                <a:solidFill>
+                  <a:schemeClr val="tx1"/>
+                </a:solidFill>
+                <a:effectLst/>
+                <a:latin typeface="+mn-lt"/>
+                <a:ea typeface="+mn-ea"/>
+                <a:cs typeface="+mn-cs"/>
+              </a:rPr>
+              <a:t>One-way : Either changing the model updates the view, or changing the view updates the model.</a:t>
+            </a:r>
+          </a:p>
+          <a:p>
+            <a:r>
+              <a:rPr lang="en-US" sz="1200" kern="1200" dirty="0" smtClean="0">
+                <a:solidFill>
+                  <a:schemeClr val="tx1"/>
+                </a:solidFill>
+                <a:effectLst/>
+                <a:latin typeface="+mn-lt"/>
+                <a:ea typeface="+mn-ea"/>
+                <a:cs typeface="+mn-cs"/>
+              </a:rPr>
+              <a:t>Two-way: Changing either the model or the view, updates the other.</a:t>
+            </a:r>
+          </a:p>
+          <a:p>
+            <a:r>
+              <a:rPr lang="en-US" sz="1200" kern="1200" dirty="0" smtClean="0">
+                <a:solidFill>
+                  <a:schemeClr val="tx1"/>
+                </a:solidFill>
+                <a:effectLst/>
+                <a:latin typeface="+mn-lt"/>
+                <a:ea typeface="+mn-ea"/>
+                <a:cs typeface="+mn-cs"/>
+              </a:rPr>
+              <a:t>We’re going to be working with Backbone. It’s the easiest framework to plug into an existing application, and even when you want to use a larger framework, the ideas learned from Backbone are a good starting to organizing front end code.</a:t>
+            </a:r>
+          </a:p>
+          <a:p>
             <a:endParaRPr lang="en-US" dirty="0"/>
           </a:p>
         </p:txBody>
@@ -1106,7 +1804,95 @@
           <a:p>
             <a:fld id="{226D8804-485E-4FFF-82C8-55C7FB916C72}" type="slidenum">
               <a:rPr lang="en-US" smtClean="0"/>
-              <a:t>9</a:t>
+              <a:t>1</a:t>
+            </a:fld>
+            <a:endParaRPr lang="en-US"/>
+          </a:p>
+        </p:txBody>
+      </p:sp>
+    </p:spTree>
+    <p:extLst>
+      <p:ext uri="{BB962C8B-B14F-4D97-AF65-F5344CB8AC3E}">
+        <p14:creationId xmlns:p14="http://schemas.microsoft.com/office/powerpoint/2010/main" val="3545669729"/>
+      </p:ext>
+    </p:extLst>
+  </p:cSld>
+  <p:clrMapOvr>
+    <a:masterClrMapping/>
+  </p:clrMapOvr>
+</p:notes>
+</file>
+
+<file path=ppt/notesSlides/notesSlide2.xml><?xml version="1.0" encoding="utf-8"?>
+<p:notes xmlns:a="http://schemas.openxmlformats.org/drawingml/2006/main" xmlns:r="http://schemas.openxmlformats.org/officeDocument/2006/relationships" xmlns:p="http://schemas.openxmlformats.org/presentationml/2006/main">
+  <p:cSld>
+    <p:spTree>
+      <p:nvGrpSpPr>
+        <p:cNvPr id="1" name=""/>
+        <p:cNvGrpSpPr/>
+        <p:nvPr/>
+      </p:nvGrpSpPr>
+      <p:grpSpPr>
+        <a:xfrm>
+          <a:off x="0" y="0"/>
+          <a:ext cx="0" cy="0"/>
+          <a:chOff x="0" y="0"/>
+          <a:chExt cx="0" cy="0"/>
+        </a:xfrm>
+      </p:grpSpPr>
+      <p:sp>
+        <p:nvSpPr>
+          <p:cNvPr id="2" name="Slide Image Placeholder 1"/>
+          <p:cNvSpPr>
+            <a:spLocks noGrp="1" noRot="1" noChangeAspect="1"/>
+          </p:cNvSpPr>
+          <p:nvPr>
+            <p:ph type="sldImg"/>
+          </p:nvPr>
+        </p:nvSpPr>
+        <p:spPr/>
+      </p:sp>
+      <p:sp>
+        <p:nvSpPr>
+          <p:cNvPr id="3" name="Notes Placeholder 2"/>
+          <p:cNvSpPr>
+            <a:spLocks noGrp="1"/>
+          </p:cNvSpPr>
+          <p:nvPr>
+            <p:ph type="body" idx="1"/>
+          </p:nvPr>
+        </p:nvSpPr>
+        <p:spPr/>
+        <p:txBody>
+          <a:bodyPr/>
+          <a:lstStyle/>
+          <a:p>
+            <a:r>
+              <a:rPr lang="en-US" dirty="0" smtClean="0"/>
+              <a:t>There is another graphic you can show.</a:t>
+            </a:r>
+            <a:endParaRPr lang="en-US" dirty="0"/>
+          </a:p>
+        </p:txBody>
+      </p:sp>
+      <p:sp>
+        <p:nvSpPr>
+          <p:cNvPr id="4" name="Slide Number Placeholder 3"/>
+          <p:cNvSpPr>
+            <a:spLocks noGrp="1"/>
+          </p:cNvSpPr>
+          <p:nvPr>
+            <p:ph type="sldNum" sz="quarter" idx="10"/>
+          </p:nvPr>
+        </p:nvSpPr>
+        <p:spPr/>
+        <p:txBody>
+          <a:bodyPr/>
+          <a:lstStyle/>
+          <a:p>
+            <a:fld id="{226D8804-485E-4FFF-82C8-55C7FB916C72}" type="slidenum">
+              <a:rPr lang="en-US" smtClean="0"/>
+              <a:t>11</a:t>
             </a:fld>
             <a:endParaRPr lang="en-US"/>
           </a:p>
@@ -1116,6 +1902,189 @@
     <p:extLst>
       <p:ext uri="{BB962C8B-B14F-4D97-AF65-F5344CB8AC3E}">
         <p14:creationId xmlns:p14="http://schemas.microsoft.com/office/powerpoint/2010/main" val="2328394692"/>
+      </p:ext>
+    </p:extLst>
+  </p:cSld>
+  <p:clrMapOvr>
+    <a:masterClrMapping/>
+  </p:clrMapOvr>
+</p:notes>
+</file>
+
+<file path=ppt/notesSlides/notesSlide3.xml><?xml version="1.0" encoding="utf-8"?>
+<p:notes xmlns:a="http://schemas.openxmlformats.org/drawingml/2006/main" xmlns:r="http://schemas.openxmlformats.org/officeDocument/2006/relationships" xmlns:p="http://schemas.openxmlformats.org/presentationml/2006/main">
+  <p:cSld>
+    <p:spTree>
+      <p:nvGrpSpPr>
+        <p:cNvPr id="1" name=""/>
+        <p:cNvGrpSpPr/>
+        <p:nvPr/>
+      </p:nvGrpSpPr>
+      <p:grpSpPr>
+        <a:xfrm>
+          <a:off x="0" y="0"/>
+          <a:ext cx="0" cy="0"/>
+          <a:chOff x="0" y="0"/>
+          <a:chExt cx="0" cy="0"/>
+        </a:xfrm>
+      </p:grpSpPr>
+      <p:sp>
+        <p:nvSpPr>
+          <p:cNvPr id="2" name="Slide Image Placeholder 1"/>
+          <p:cNvSpPr>
+            <a:spLocks noGrp="1" noRot="1" noChangeAspect="1"/>
+          </p:cNvSpPr>
+          <p:nvPr>
+            <p:ph type="sldImg"/>
+          </p:nvPr>
+        </p:nvSpPr>
+        <p:spPr/>
+      </p:sp>
+      <p:sp>
+        <p:nvSpPr>
+          <p:cNvPr id="3" name="Notes Placeholder 2"/>
+          <p:cNvSpPr>
+            <a:spLocks noGrp="1"/>
+          </p:cNvSpPr>
+          <p:nvPr>
+            <p:ph type="body" idx="1"/>
+          </p:nvPr>
+        </p:nvSpPr>
+        <p:spPr/>
+        <p:txBody>
+          <a:bodyPr/>
+          <a:lstStyle/>
+          <a:p>
+            <a:r>
+              <a:rPr lang="en-US" dirty="0" smtClean="0"/>
+              <a:t>Be</a:t>
+            </a:r>
+            <a:r>
+              <a:rPr lang="en-US" baseline="0" dirty="0" smtClean="0"/>
+              <a:t> more brief on this slide, don’t say anything controversial.</a:t>
+            </a:r>
+          </a:p>
+        </p:txBody>
+      </p:sp>
+      <p:sp>
+        <p:nvSpPr>
+          <p:cNvPr id="4" name="Slide Number Placeholder 3"/>
+          <p:cNvSpPr>
+            <a:spLocks noGrp="1"/>
+          </p:cNvSpPr>
+          <p:nvPr>
+            <p:ph type="sldNum" sz="quarter" idx="10"/>
+          </p:nvPr>
+        </p:nvSpPr>
+        <p:spPr/>
+        <p:txBody>
+          <a:bodyPr/>
+          <a:lstStyle/>
+          <a:p>
+            <a:fld id="{226D8804-485E-4FFF-82C8-55C7FB916C72}" type="slidenum">
+              <a:rPr lang="en-US" smtClean="0"/>
+              <a:t>12</a:t>
+            </a:fld>
+            <a:endParaRPr lang="en-US"/>
+          </a:p>
+        </p:txBody>
+      </p:sp>
+    </p:spTree>
+    <p:extLst>
+      <p:ext uri="{BB962C8B-B14F-4D97-AF65-F5344CB8AC3E}">
+        <p14:creationId xmlns:p14="http://schemas.microsoft.com/office/powerpoint/2010/main" val="1718200339"/>
+      </p:ext>
+    </p:extLst>
+  </p:cSld>
+  <p:clrMapOvr>
+    <a:masterClrMapping/>
+  </p:clrMapOvr>
+</p:notes>
+</file>
+
+<file path=ppt/notesSlides/notesSlide4.xml><?xml version="1.0" encoding="utf-8"?>
+<p:notes xmlns:a="http://schemas.openxmlformats.org/drawingml/2006/main" xmlns:r="http://schemas.openxmlformats.org/officeDocument/2006/relationships" xmlns:p="http://schemas.openxmlformats.org/presentationml/2006/main">
+  <p:cSld>
+    <p:spTree>
+      <p:nvGrpSpPr>
+        <p:cNvPr id="1" name=""/>
+        <p:cNvGrpSpPr/>
+        <p:nvPr/>
+      </p:nvGrpSpPr>
+      <p:grpSpPr>
+        <a:xfrm>
+          <a:off x="0" y="0"/>
+          <a:ext cx="0" cy="0"/>
+          <a:chOff x="0" y="0"/>
+          <a:chExt cx="0" cy="0"/>
+        </a:xfrm>
+      </p:grpSpPr>
+      <p:sp>
+        <p:nvSpPr>
+          <p:cNvPr id="2" name="Slide Image Placeholder 1"/>
+          <p:cNvSpPr>
+            <a:spLocks noGrp="1" noRot="1" noChangeAspect="1"/>
+          </p:cNvSpPr>
+          <p:nvPr>
+            <p:ph type="sldImg"/>
+          </p:nvPr>
+        </p:nvSpPr>
+        <p:spPr/>
+      </p:sp>
+      <p:sp>
+        <p:nvSpPr>
+          <p:cNvPr id="3" name="Notes Placeholder 2"/>
+          <p:cNvSpPr>
+            <a:spLocks noGrp="1"/>
+          </p:cNvSpPr>
+          <p:nvPr>
+            <p:ph type="body" idx="1"/>
+          </p:nvPr>
+        </p:nvSpPr>
+        <p:spPr/>
+        <p:txBody>
+          <a:bodyPr/>
+          <a:lstStyle/>
+          <a:p>
+            <a:r>
+              <a:rPr lang="en-US" dirty="0" smtClean="0"/>
+              <a:t>Doesn’t prescribe an architecture, which</a:t>
+            </a:r>
+            <a:r>
+              <a:rPr lang="en-US" baseline="0" dirty="0" smtClean="0"/>
+              <a:t> allows you to adapt it to be used in an architecture of your design.</a:t>
+            </a:r>
+            <a:endParaRPr lang="en-US" dirty="0"/>
+          </a:p>
+        </p:txBody>
+      </p:sp>
+      <p:sp>
+        <p:nvSpPr>
+          <p:cNvPr id="4" name="Slide Number Placeholder 3"/>
+          <p:cNvSpPr>
+            <a:spLocks noGrp="1"/>
+          </p:cNvSpPr>
+          <p:nvPr>
+            <p:ph type="sldNum" sz="quarter" idx="10"/>
+          </p:nvPr>
+        </p:nvSpPr>
+        <p:spPr/>
+        <p:txBody>
+          <a:bodyPr/>
+          <a:lstStyle/>
+          <a:p>
+            <a:fld id="{226D8804-485E-4FFF-82C8-55C7FB916C72}" type="slidenum">
+              <a:rPr lang="en-US" smtClean="0"/>
+              <a:t>15</a:t>
+            </a:fld>
+            <a:endParaRPr lang="en-US"/>
+          </a:p>
+        </p:txBody>
+      </p:sp>
+    </p:spTree>
+    <p:extLst>
+      <p:ext uri="{BB962C8B-B14F-4D97-AF65-F5344CB8AC3E}">
+        <p14:creationId xmlns:p14="http://schemas.microsoft.com/office/powerpoint/2010/main" val="3534967089"/>
       </p:ext>
     </p:extLst>
   </p:cSld>
@@ -2711,6 +3680,298 @@
       </p:sp>
       <p:sp>
         <p:nvSpPr>
+          <p:cNvPr id="3" name="Content Placeholder 2"/>
+          <p:cNvSpPr>
+            <a:spLocks noGrp="1"/>
+          </p:cNvSpPr>
+          <p:nvPr>
+            <p:ph idx="1"/>
+          </p:nvPr>
+        </p:nvSpPr>
+        <p:spPr>
+          <a:xfrm>
+            <a:off x="457200" y="1493837"/>
+            <a:ext cx="8229600" cy="4525963"/>
+          </a:xfrm>
+        </p:spPr>
+        <p:txBody>
+          <a:bodyPr/>
+          <a:lstStyle/>
+          <a:p>
+            <a:r>
+              <a:rPr lang="en-US" dirty="0" smtClean="0"/>
+              <a:t>Some Major Frameworks/Libraries</a:t>
+            </a:r>
+          </a:p>
+          <a:p>
+            <a:pPr lvl="1"/>
+            <a:r>
+              <a:rPr lang="en-US" dirty="0" smtClean="0"/>
+              <a:t>Angular</a:t>
+            </a:r>
+          </a:p>
+          <a:p>
+            <a:pPr lvl="1"/>
+            <a:r>
+              <a:rPr lang="en-US" dirty="0" smtClean="0"/>
+              <a:t>Backbone</a:t>
+            </a:r>
+          </a:p>
+          <a:p>
+            <a:pPr lvl="1"/>
+            <a:r>
+              <a:rPr lang="en-US" dirty="0" smtClean="0"/>
+              <a:t>Ember</a:t>
+            </a:r>
+          </a:p>
+          <a:p>
+            <a:pPr lvl="1"/>
+            <a:r>
+              <a:rPr lang="en-US" dirty="0" smtClean="0"/>
+              <a:t>Knockout</a:t>
+            </a:r>
+          </a:p>
+          <a:p>
+            <a:pPr lvl="1"/>
+            <a:r>
+              <a:rPr lang="en-US" dirty="0" smtClean="0"/>
+              <a:t>Others </a:t>
+            </a:r>
+            <a:r>
+              <a:rPr lang="en-US" sz="2000" dirty="0" smtClean="0"/>
+              <a:t>(</a:t>
+            </a:r>
+            <a:r>
+              <a:rPr lang="en-US" sz="2000" dirty="0" err="1" smtClean="0"/>
+              <a:t>CanJs,Meteor,MooTools,Ext</a:t>
+            </a:r>
+            <a:r>
+              <a:rPr lang="en-US" sz="2000" dirty="0" smtClean="0"/>
+              <a:t>)</a:t>
+            </a:r>
+            <a:endParaRPr lang="en-US" dirty="0" smtClean="0"/>
+          </a:p>
+          <a:p>
+            <a:r>
+              <a:rPr lang="en-US" dirty="0" smtClean="0"/>
+              <a:t>Size Vs. Power Vs. Complexity</a:t>
+            </a:r>
+          </a:p>
+          <a:p>
+            <a:r>
+              <a:rPr lang="en-US" dirty="0" smtClean="0"/>
+              <a:t>How much control do you want?</a:t>
+            </a:r>
+          </a:p>
+          <a:p>
+            <a:endParaRPr lang="en-US" dirty="0"/>
+          </a:p>
+        </p:txBody>
+      </p:sp>
+      <p:sp>
+        <p:nvSpPr>
+          <p:cNvPr id="4" name="Text Placeholder 3"/>
+          <p:cNvSpPr>
+            <a:spLocks noGrp="1"/>
+          </p:cNvSpPr>
+          <p:nvPr>
+            <p:ph type="body" sz="quarter" idx="10"/>
+          </p:nvPr>
+        </p:nvSpPr>
+        <p:spPr/>
+        <p:txBody>
+          <a:bodyPr/>
+          <a:lstStyle/>
+          <a:p>
+            <a:r>
+              <a:rPr lang="en-US" dirty="0" smtClean="0"/>
+              <a:t>A guided tour of the community.</a:t>
+            </a:r>
+            <a:endParaRPr lang="en-US" dirty="0"/>
+          </a:p>
+        </p:txBody>
+      </p:sp>
+    </p:spTree>
+    <p:extLst>
+      <p:ext uri="{BB962C8B-B14F-4D97-AF65-F5344CB8AC3E}">
+        <p14:creationId xmlns:p14="http://schemas.microsoft.com/office/powerpoint/2010/main" val="3999765243"/>
+      </p:ext>
+    </p:extLst>
+  </p:cSld>
+  <p:clrMapOvr>
+    <a:masterClrMapping/>
+  </p:clrMapOvr>
+  <p:transition spd="slow">
+    <p:push dir="u"/>
+  </p:transition>
+  <p:timing>
+    <p:tnLst>
+      <p:par>
+        <p:cTn id="1" dur="indefinite" restart="never" nodeType="tmRoot"/>
+      </p:par>
+    </p:tnLst>
+  </p:timing>
+</p:sld>
+</file>
+
+<file path=ppt/slides/slide11.xml><?xml version="1.0" encoding="utf-8"?>
+<p:sld xmlns:a="http://schemas.openxmlformats.org/drawingml/2006/main" xmlns:r="http://schemas.openxmlformats.org/officeDocument/2006/relationships" xmlns:p="http://schemas.openxmlformats.org/presentationml/2006/main">
+  <p:cSld>
+    <p:spTree>
+      <p:nvGrpSpPr>
+        <p:cNvPr id="1" name=""/>
+        <p:cNvGrpSpPr/>
+        <p:nvPr/>
+      </p:nvGrpSpPr>
+      <p:grpSpPr>
+        <a:xfrm>
+          <a:off x="0" y="0"/>
+          <a:ext cx="0" cy="0"/>
+          <a:chOff x="0" y="0"/>
+          <a:chExt cx="0" cy="0"/>
+        </a:xfrm>
+      </p:grpSpPr>
+      <p:sp>
+        <p:nvSpPr>
+          <p:cNvPr id="2" name="Title 1"/>
+          <p:cNvSpPr>
+            <a:spLocks noGrp="1"/>
+          </p:cNvSpPr>
+          <p:nvPr>
+            <p:ph type="title"/>
+          </p:nvPr>
+        </p:nvSpPr>
+        <p:spPr/>
+        <p:txBody>
+          <a:bodyPr/>
+          <a:lstStyle/>
+          <a:p>
+            <a:r>
+              <a:rPr lang="en-US" dirty="0" smtClean="0"/>
+              <a:t>Frameworks</a:t>
+            </a:r>
+            <a:endParaRPr lang="en-US" dirty="0"/>
+          </a:p>
+        </p:txBody>
+      </p:sp>
+      <p:sp>
+        <p:nvSpPr>
+          <p:cNvPr id="4" name="Text Placeholder 3"/>
+          <p:cNvSpPr>
+            <a:spLocks noGrp="1"/>
+          </p:cNvSpPr>
+          <p:nvPr>
+            <p:ph type="body" sz="quarter" idx="10"/>
+          </p:nvPr>
+        </p:nvSpPr>
+        <p:spPr>
+          <a:xfrm>
+            <a:off x="304800" y="711200"/>
+            <a:ext cx="5791200" cy="508000"/>
+          </a:xfrm>
+        </p:spPr>
+        <p:txBody>
+          <a:bodyPr/>
+          <a:lstStyle/>
+          <a:p>
+            <a:r>
+              <a:rPr lang="en-US" dirty="0" smtClean="0"/>
+              <a:t>A Market Share Survey</a:t>
+            </a:r>
+            <a:endParaRPr lang="en-US" dirty="0"/>
+          </a:p>
+        </p:txBody>
+      </p:sp>
+      <p:graphicFrame>
+        <p:nvGraphicFramePr>
+          <p:cNvPr id="8" name="Content Placeholder 7"/>
+          <p:cNvGraphicFramePr>
+            <a:graphicFrameLocks noGrp="1"/>
+          </p:cNvGraphicFramePr>
+          <p:nvPr>
+            <p:ph idx="1"/>
+            <p:extLst>
+              <p:ext uri="{D42A27DB-BD31-4B8C-83A1-F6EECF244321}">
+                <p14:modId xmlns:p14="http://schemas.microsoft.com/office/powerpoint/2010/main" val="1104780721"/>
+              </p:ext>
+            </p:extLst>
+          </p:nvPr>
+        </p:nvGraphicFramePr>
+        <p:xfrm>
+          <a:off x="152400" y="1295400"/>
+          <a:ext cx="8839200" cy="4953000"/>
+        </p:xfrm>
+        <a:graphic>
+          <a:graphicData uri="http://schemas.openxmlformats.org/drawingml/2006/chart">
+            <c:chart xmlns:c="http://schemas.openxmlformats.org/drawingml/2006/chart" xmlns:r="http://schemas.openxmlformats.org/officeDocument/2006/relationships" r:id="rId3"/>
+          </a:graphicData>
+        </a:graphic>
+      </p:graphicFrame>
+    </p:spTree>
+    <p:extLst>
+      <p:ext uri="{BB962C8B-B14F-4D97-AF65-F5344CB8AC3E}">
+        <p14:creationId xmlns:p14="http://schemas.microsoft.com/office/powerpoint/2010/main" val="2722999129"/>
+      </p:ext>
+    </p:extLst>
+  </p:cSld>
+  <p:clrMapOvr>
+    <a:masterClrMapping/>
+  </p:clrMapOvr>
+  <p:transition spd="slow">
+    <p:push dir="u"/>
+  </p:transition>
+  <p:timing>
+    <p:tnLst>
+      <p:par>
+        <p:cTn id="1" dur="indefinite" restart="never" nodeType="tmRoot"/>
+      </p:par>
+    </p:tnLst>
+  </p:timing>
+</p:sld>
+</file>
+
+<file path=ppt/slides/slide12.xml><?xml version="1.0" encoding="utf-8"?>
+<p:sld xmlns:a="http://schemas.openxmlformats.org/drawingml/2006/main" xmlns:r="http://schemas.openxmlformats.org/officeDocument/2006/relationships" xmlns:p="http://schemas.openxmlformats.org/presentationml/2006/main">
+  <p:cSld>
+    <p:spTree>
+      <p:nvGrpSpPr>
+        <p:cNvPr id="1" name=""/>
+        <p:cNvGrpSpPr/>
+        <p:nvPr/>
+      </p:nvGrpSpPr>
+      <p:grpSpPr>
+        <a:xfrm>
+          <a:off x="0" y="0"/>
+          <a:ext cx="0" cy="0"/>
+          <a:chOff x="0" y="0"/>
+          <a:chExt cx="0" cy="0"/>
+        </a:xfrm>
+      </p:grpSpPr>
+      <p:sp>
+        <p:nvSpPr>
+          <p:cNvPr id="2" name="Title 1"/>
+          <p:cNvSpPr>
+            <a:spLocks noGrp="1"/>
+          </p:cNvSpPr>
+          <p:nvPr>
+            <p:ph type="title"/>
+          </p:nvPr>
+        </p:nvSpPr>
+        <p:spPr/>
+        <p:txBody>
+          <a:bodyPr/>
+          <a:lstStyle/>
+          <a:p>
+            <a:r>
+              <a:rPr lang="en-US" dirty="0" smtClean="0"/>
+              <a:t>Frameworks</a:t>
+            </a:r>
+            <a:endParaRPr lang="en-US" dirty="0"/>
+          </a:p>
+        </p:txBody>
+      </p:sp>
+      <p:sp>
+        <p:nvSpPr>
           <p:cNvPr id="4" name="Text Placeholder 3"/>
           <p:cNvSpPr>
             <a:spLocks noGrp="1"/>
@@ -2758,7 +4019,7 @@
           <a:graphicData uri="http://schemas.openxmlformats.org/presentationml/2006/ole">
             <mc:AlternateContent xmlns:mc="http://schemas.openxmlformats.org/markup-compatibility/2006">
               <mc:Choice xmlns:v="urn:schemas-microsoft-com:vml" Requires="v">
-                <p:oleObj spid="_x0000_s1059" name="Worksheet" r:id="rId4" imgW="3114720" imgH="1095285" progId="Excel.Sheet.12">
+                <p:oleObj spid="_x0000_s1063" name="Worksheet" r:id="rId4" imgW="3114720" imgH="1095285" progId="Excel.Sheet.12">
                   <p:embed/>
                 </p:oleObj>
               </mc:Choice>
@@ -2816,8 +4077,13 @@
           <a:p>
             <a:r>
               <a:rPr lang="en-US" sz="2400" dirty="0" smtClean="0"/>
-              <a:t>*As of 01/06/2013</a:t>
-            </a:r>
+              <a:t>*As of </a:t>
+            </a:r>
+            <a:r>
+              <a:rPr lang="en-US" sz="2400" dirty="0" smtClean="0"/>
+              <a:t>01/06/2014</a:t>
+            </a:r>
+            <a:endParaRPr lang="en-US" sz="2400" dirty="0" smtClean="0"/>
           </a:p>
         </p:txBody>
       </p:sp>
@@ -2844,7 +4110,7 @@
 </p:sld>
 </file>
 
-<file path=ppt/slides/slide11.xml><?xml version="1.0" encoding="utf-8"?>
+<file path=ppt/slides/slide13.xml><?xml version="1.0" encoding="utf-8"?>
 <p:sld xmlns:a="http://schemas.openxmlformats.org/drawingml/2006/main" xmlns:r="http://schemas.openxmlformats.org/officeDocument/2006/relationships" xmlns:p="http://schemas.openxmlformats.org/presentationml/2006/main">
   <p:cSld>
     <p:spTree>
@@ -3004,7 +4270,7 @@
 </p:sld>
 </file>
 
-<file path=ppt/slides/slide12.xml><?xml version="1.0" encoding="utf-8"?>
+<file path=ppt/slides/slide14.xml><?xml version="1.0" encoding="utf-8"?>
 <p:sld xmlns:a="http://schemas.openxmlformats.org/drawingml/2006/main" xmlns:r="http://schemas.openxmlformats.org/officeDocument/2006/relationships" xmlns:p="http://schemas.openxmlformats.org/presentationml/2006/main">
   <p:cSld>
     <p:spTree>
@@ -3062,7 +4328,7 @@
         </p:spPr>
         <p:txBody>
           <a:bodyPr>
-            <a:normAutofit fontScale="70000" lnSpcReduction="20000"/>
+            <a:normAutofit fontScale="77500" lnSpcReduction="20000"/>
           </a:bodyPr>
           <a:lstStyle/>
           <a:p>
@@ -3100,7 +4366,7 @@
           <a:p>
             <a:r>
               <a:rPr lang="en-US" dirty="0" smtClean="0"/>
-              <a:t>An opinionated </a:t>
+              <a:t>A declarative </a:t>
             </a:r>
             <a:r>
               <a:rPr lang="en-US" b="1" dirty="0" smtClean="0"/>
@@ -3144,13 +4410,11 @@
           <a:p>
             <a:r>
               <a:rPr lang="en-US" dirty="0" smtClean="0"/>
-              <a:t>Declarative DOM based templates.</a:t>
-            </a:r>
-          </a:p>
-          <a:p>
-            <a:r>
-              <a:rPr lang="en-US" dirty="0" smtClean="0"/>
-              <a:t>Used for the PS3 </a:t>
+              <a:t>Used </a:t>
+            </a:r>
+            <a:r>
+              <a:rPr lang="en-US" dirty="0" smtClean="0"/>
+              <a:t>for the PS3 </a:t>
             </a:r>
             <a:r>
               <a:rPr lang="en-US" dirty="0" err="1" smtClean="0"/>
@@ -3259,7 +4523,7 @@
 </p:sld>
 </file>
 
-<file path=ppt/slides/slide13.xml><?xml version="1.0" encoding="utf-8"?>
+<file path=ppt/slides/slide15.xml><?xml version="1.0" encoding="utf-8"?>
 <p:sld xmlns:a="http://schemas.openxmlformats.org/drawingml/2006/main" xmlns:r="http://schemas.openxmlformats.org/officeDocument/2006/relationships" xmlns:p="http://schemas.openxmlformats.org/presentationml/2006/main">
   <p:cSld>
     <p:spTree>
@@ -3330,7 +4594,7 @@
           <a:p>
             <a:r>
               <a:rPr lang="en-US" dirty="0" smtClean="0"/>
-              <a:t>Not opinionated at all, a smaller </a:t>
+              <a:t>A smaller </a:t>
             </a:r>
             <a:r>
               <a:rPr lang="en-US" b="1" dirty="0" smtClean="0"/>
@@ -3356,7 +4620,15 @@
           <a:p>
             <a:r>
               <a:rPr lang="en-US" dirty="0" smtClean="0"/>
-              <a:t>No template framework provided, Backbone or Mustache commonly used.</a:t>
+              <a:t>Uses Underscore’s template method</a:t>
+            </a:r>
+            <a:r>
+              <a:rPr lang="en-US" dirty="0" smtClean="0"/>
+              <a:t>, but Handlebars </a:t>
+            </a:r>
+            <a:r>
+              <a:rPr lang="en-US" dirty="0" smtClean="0"/>
+              <a:t>or Mustache commonly used.</a:t>
             </a:r>
           </a:p>
           <a:p>
@@ -3429,7 +4701,7 @@
           <p:nvPr/>
         </p:nvPicPr>
         <p:blipFill>
-          <a:blip r:embed="rId2" cstate="print">
+          <a:blip r:embed="rId3" cstate="print">
             <a:extLst>
               <a:ext uri="{28A0092B-C50C-407E-A947-70E740481C1C}">
                 <a14:useLocalDpi xmlns:a14="http://schemas.microsoft.com/office/drawing/2010/main" val="0"/>
@@ -3484,7 +4756,7 @@
 </p:sld>
 </file>
 
-<file path=ppt/slides/slide14.xml><?xml version="1.0" encoding="utf-8"?>
+<file path=ppt/slides/slide16.xml><?xml version="1.0" encoding="utf-8"?>
 <p:sld xmlns:a="http://schemas.openxmlformats.org/drawingml/2006/main" xmlns:r="http://schemas.openxmlformats.org/officeDocument/2006/relationships" xmlns:p="http://schemas.openxmlformats.org/presentationml/2006/main">
   <p:cSld>
     <p:spTree>
@@ -3537,7 +4809,7 @@
         <p:spPr/>
         <p:txBody>
           <a:bodyPr>
-            <a:normAutofit fontScale="85000" lnSpcReduction="20000"/>
+            <a:normAutofit fontScale="85000" lnSpcReduction="10000"/>
           </a:bodyPr>
           <a:lstStyle/>
           <a:p>
@@ -3564,16 +4836,16 @@
               <a:t>SproutCore</a:t>
             </a:r>
             <a:r>
-              <a:rPr lang="en-US" dirty="0" smtClean="0"/>
-              <a:t> </a:t>
-            </a:r>
-            <a:r>
-              <a:rPr lang="en-US" b="1" dirty="0" smtClean="0"/>
-              <a:t>framework</a:t>
-            </a:r>
-            <a:r>
-              <a:rPr lang="en-US" dirty="0" smtClean="0"/>
-              <a:t>’s move towards JQuery.</a:t>
+              <a:rPr lang="en-US" dirty="0" err="1" smtClean="0"/>
+              <a:t>’s</a:t>
+            </a:r>
+            <a:r>
+              <a:rPr lang="en-US" dirty="0" smtClean="0"/>
+              <a:t> move </a:t>
+            </a:r>
+            <a:r>
+              <a:rPr lang="en-US" dirty="0" smtClean="0"/>
+              <a:t>towards JQuery.</a:t>
             </a:r>
             <a:endParaRPr lang="en-US" dirty="0"/>
           </a:p>
@@ -3592,7 +4864,11 @@
           <a:p>
             <a:r>
               <a:rPr lang="en-US" dirty="0" smtClean="0"/>
-              <a:t>Very opinionated, depending on scaffolding and convention.</a:t>
+              <a:t>Depends </a:t>
+            </a:r>
+            <a:r>
+              <a:rPr lang="en-US" dirty="0" smtClean="0"/>
+              <a:t>on scaffolding and convention.</a:t>
             </a:r>
           </a:p>
           <a:p>
@@ -3715,7 +4991,7 @@
 </p:sld>
 </file>
 
-<file path=ppt/slides/slide15.xml><?xml version="1.0" encoding="utf-8"?>
+<file path=ppt/slides/slide17.xml><?xml version="1.0" encoding="utf-8"?>
 <p:sld xmlns:a="http://schemas.openxmlformats.org/drawingml/2006/main" xmlns:r="http://schemas.openxmlformats.org/officeDocument/2006/relationships" xmlns:p="http://schemas.openxmlformats.org/presentationml/2006/main">
   <p:cSld>
     <p:spTree>
@@ -3827,11 +5103,15 @@
             </a:r>
             <a:r>
               <a:rPr lang="en-US" dirty="0" err="1" smtClean="0"/>
-              <a:t>jsfiddle</a:t>
-            </a:r>
-            <a:r>
-              <a:rPr lang="en-US" dirty="0" smtClean="0"/>
-              <a:t> and many others. </a:t>
+              <a:t>jsFiddle</a:t>
+            </a:r>
+            <a:r>
+              <a:rPr lang="en-US" dirty="0" smtClean="0"/>
+              <a:t> </a:t>
+            </a:r>
+            <a:r>
+              <a:rPr lang="en-US" dirty="0" smtClean="0"/>
+              <a:t>and many others. </a:t>
             </a:r>
             <a:endParaRPr lang="en-US" dirty="0"/>
           </a:p>
@@ -3924,7 +5204,7 @@
 </p:sld>
 </file>
 
-<file path=ppt/slides/slide16.xml><?xml version="1.0" encoding="utf-8"?>
+<file path=ppt/slides/slide18.xml><?xml version="1.0" encoding="utf-8"?>
 <p:sld xmlns:a="http://schemas.openxmlformats.org/drawingml/2006/main" xmlns:r="http://schemas.openxmlformats.org/officeDocument/2006/relationships" xmlns:p="http://schemas.openxmlformats.org/presentationml/2006/main">
   <p:cSld>
     <p:spTree>
@@ -4080,294 +5360,6 @@
 </p:sld>
 </file>
 
-<file path=ppt/slides/slide17.xml><?xml version="1.0" encoding="utf-8"?>
-<p:sld xmlns:a="http://schemas.openxmlformats.org/drawingml/2006/main" xmlns:r="http://schemas.openxmlformats.org/officeDocument/2006/relationships" xmlns:p="http://schemas.openxmlformats.org/presentationml/2006/main">
-  <p:cSld>
-    <p:spTree>
-      <p:nvGrpSpPr>
-        <p:cNvPr id="1" name=""/>
-        <p:cNvGrpSpPr/>
-        <p:nvPr/>
-      </p:nvGrpSpPr>
-      <p:grpSpPr>
-        <a:xfrm>
-          <a:off x="0" y="0"/>
-          <a:ext cx="0" cy="0"/>
-          <a:chOff x="0" y="0"/>
-          <a:chExt cx="0" cy="0"/>
-        </a:xfrm>
-      </p:grpSpPr>
-      <p:sp>
-        <p:nvSpPr>
-          <p:cNvPr id="2" name="Title 1"/>
-          <p:cNvSpPr>
-            <a:spLocks noGrp="1"/>
-          </p:cNvSpPr>
-          <p:nvPr>
-            <p:ph type="title"/>
-          </p:nvPr>
-        </p:nvSpPr>
-        <p:spPr/>
-        <p:txBody>
-          <a:bodyPr/>
-          <a:lstStyle/>
-          <a:p>
-            <a:r>
-              <a:rPr lang="en-US" dirty="0" smtClean="0"/>
-              <a:t>Frameworks</a:t>
-            </a:r>
-            <a:endParaRPr lang="en-US" dirty="0"/>
-          </a:p>
-        </p:txBody>
-      </p:sp>
-      <p:sp>
-        <p:nvSpPr>
-          <p:cNvPr id="3" name="Content Placeholder 2"/>
-          <p:cNvSpPr>
-            <a:spLocks noGrp="1"/>
-          </p:cNvSpPr>
-          <p:nvPr>
-            <p:ph idx="1"/>
-          </p:nvPr>
-        </p:nvSpPr>
-        <p:spPr/>
-        <p:txBody>
-          <a:bodyPr>
-            <a:normAutofit fontScale="92500"/>
-          </a:bodyPr>
-          <a:lstStyle/>
-          <a:p>
-            <a:r>
-              <a:rPr lang="en-US" dirty="0" smtClean="0"/>
-              <a:t>A dozen or so popular frameworks.</a:t>
-            </a:r>
-          </a:p>
-          <a:p>
-            <a:r>
-              <a:rPr lang="en-US" dirty="0" smtClean="0"/>
-              <a:t>The correct choice is dependent on application size and complexity.</a:t>
-            </a:r>
-          </a:p>
-          <a:p>
-            <a:r>
-              <a:rPr lang="en-US" dirty="0" smtClean="0"/>
-              <a:t>Backbone.js</a:t>
-            </a:r>
-          </a:p>
-          <a:p>
-            <a:pPr lvl="1"/>
-            <a:r>
-              <a:rPr lang="en-US" dirty="0" smtClean="0"/>
-              <a:t>Unobtrusive / Not opinionated.</a:t>
-            </a:r>
-          </a:p>
-          <a:p>
-            <a:pPr lvl="1"/>
-            <a:r>
-              <a:rPr lang="en-US" dirty="0" smtClean="0"/>
-              <a:t>Small, readable code base.</a:t>
-            </a:r>
-          </a:p>
-          <a:p>
-            <a:pPr lvl="1"/>
-            <a:r>
-              <a:rPr lang="en-US" dirty="0" smtClean="0"/>
-              <a:t>Add Marionette to go from library to framework.</a:t>
-            </a:r>
-          </a:p>
-          <a:p>
-            <a:pPr lvl="1"/>
-            <a:r>
-              <a:rPr lang="en-US" dirty="0" smtClean="0"/>
-              <a:t>Control your own architecture, while benefiting from some structure.</a:t>
-            </a:r>
-          </a:p>
-          <a:p>
-            <a:pPr lvl="1"/>
-            <a:endParaRPr lang="en-US" dirty="0" smtClean="0"/>
-          </a:p>
-          <a:p>
-            <a:endParaRPr lang="en-US" dirty="0"/>
-          </a:p>
-        </p:txBody>
-      </p:sp>
-      <p:sp>
-        <p:nvSpPr>
-          <p:cNvPr id="4" name="Text Placeholder 3"/>
-          <p:cNvSpPr>
-            <a:spLocks noGrp="1"/>
-          </p:cNvSpPr>
-          <p:nvPr>
-            <p:ph type="body" sz="quarter" idx="10"/>
-          </p:nvPr>
-        </p:nvSpPr>
-        <p:spPr/>
-        <p:txBody>
-          <a:bodyPr/>
-          <a:lstStyle/>
-          <a:p>
-            <a:r>
-              <a:rPr lang="en-US" dirty="0" smtClean="0"/>
-              <a:t>Conclusion</a:t>
-            </a:r>
-            <a:endParaRPr lang="en-US" dirty="0"/>
-          </a:p>
-        </p:txBody>
-      </p:sp>
-    </p:spTree>
-    <p:extLst>
-      <p:ext uri="{BB962C8B-B14F-4D97-AF65-F5344CB8AC3E}">
-        <p14:creationId xmlns:p14="http://schemas.microsoft.com/office/powerpoint/2010/main" val="1081390464"/>
-      </p:ext>
-    </p:extLst>
-  </p:cSld>
-  <p:clrMapOvr>
-    <a:masterClrMapping/>
-  </p:clrMapOvr>
-  <p:transition spd="slow">
-    <p:push dir="u"/>
-  </p:transition>
-  <p:timing>
-    <p:tnLst>
-      <p:par>
-        <p:cTn id="1" dur="indefinite" restart="never" nodeType="tmRoot"/>
-      </p:par>
-    </p:tnLst>
-  </p:timing>
-</p:sld>
-</file>
-
-<file path=ppt/slides/slide18.xml><?xml version="1.0" encoding="utf-8"?>
-<p:sld xmlns:a="http://schemas.openxmlformats.org/drawingml/2006/main" xmlns:r="http://schemas.openxmlformats.org/officeDocument/2006/relationships" xmlns:p="http://schemas.openxmlformats.org/presentationml/2006/main">
-  <p:cSld>
-    <p:spTree>
-      <p:nvGrpSpPr>
-        <p:cNvPr id="1" name=""/>
-        <p:cNvGrpSpPr/>
-        <p:nvPr/>
-      </p:nvGrpSpPr>
-      <p:grpSpPr>
-        <a:xfrm>
-          <a:off x="0" y="0"/>
-          <a:ext cx="0" cy="0"/>
-          <a:chOff x="0" y="0"/>
-          <a:chExt cx="0" cy="0"/>
-        </a:xfrm>
-      </p:grpSpPr>
-      <p:sp>
-        <p:nvSpPr>
-          <p:cNvPr id="2" name="Title 1"/>
-          <p:cNvSpPr>
-            <a:spLocks noGrp="1"/>
-          </p:cNvSpPr>
-          <p:nvPr>
-            <p:ph type="title"/>
-          </p:nvPr>
-        </p:nvSpPr>
-        <p:spPr/>
-        <p:txBody>
-          <a:bodyPr/>
-          <a:lstStyle/>
-          <a:p>
-            <a:r>
-              <a:rPr lang="en-US" dirty="0" smtClean="0"/>
-              <a:t>Sessions</a:t>
-            </a:r>
-            <a:endParaRPr lang="en-US" dirty="0"/>
-          </a:p>
-        </p:txBody>
-      </p:sp>
-      <p:sp>
-        <p:nvSpPr>
-          <p:cNvPr id="3" name="Content Placeholder 2"/>
-          <p:cNvSpPr>
-            <a:spLocks noGrp="1"/>
-          </p:cNvSpPr>
-          <p:nvPr>
-            <p:ph idx="1"/>
-          </p:nvPr>
-        </p:nvSpPr>
-        <p:spPr/>
-        <p:txBody>
-          <a:bodyPr/>
-          <a:lstStyle/>
-          <a:p>
-            <a:r>
-              <a:rPr lang="en-US" dirty="0" smtClean="0"/>
-              <a:t>We’ll return later!</a:t>
-            </a:r>
-          </a:p>
-          <a:p>
-            <a:pPr lvl="1"/>
-            <a:r>
-              <a:rPr lang="en-US" dirty="0" smtClean="0"/>
-              <a:t>Break time</a:t>
-            </a:r>
-          </a:p>
-          <a:p>
-            <a:pPr lvl="1"/>
-            <a:r>
-              <a:rPr lang="en-US" dirty="0" smtClean="0"/>
-              <a:t>Wrap-up.</a:t>
-            </a:r>
-          </a:p>
-          <a:p>
-            <a:pPr lvl="1"/>
-            <a:endParaRPr lang="en-US" dirty="0" smtClean="0"/>
-          </a:p>
-        </p:txBody>
-      </p:sp>
-      <p:sp>
-        <p:nvSpPr>
-          <p:cNvPr id="4" name="Text Placeholder 3"/>
-          <p:cNvSpPr>
-            <a:spLocks noGrp="1"/>
-          </p:cNvSpPr>
-          <p:nvPr>
-            <p:ph type="body" sz="quarter" idx="10"/>
-          </p:nvPr>
-        </p:nvSpPr>
-        <p:spPr>
-          <a:xfrm>
-            <a:off x="304800" y="711200"/>
-            <a:ext cx="6477000" cy="508000"/>
-          </a:xfrm>
-        </p:spPr>
-        <p:txBody>
-          <a:bodyPr/>
-          <a:lstStyle/>
-          <a:p>
-            <a:r>
-              <a:rPr lang="en-US" sz="2000" dirty="0" smtClean="0"/>
-              <a:t>Let’s start coding</a:t>
-            </a:r>
-            <a:endParaRPr lang="en-US" sz="2000" dirty="0"/>
-          </a:p>
-        </p:txBody>
-      </p:sp>
-    </p:spTree>
-    <p:extLst>
-      <p:ext uri="{BB962C8B-B14F-4D97-AF65-F5344CB8AC3E}">
-        <p14:creationId xmlns:p14="http://schemas.microsoft.com/office/powerpoint/2010/main" val="4037308671"/>
-      </p:ext>
-    </p:extLst>
-  </p:cSld>
-  <p:clrMapOvr>
-    <a:masterClrMapping/>
-  </p:clrMapOvr>
-  <p:transition spd="slow">
-    <p:push dir="u"/>
-  </p:transition>
-  <p:timing>
-    <p:tnLst>
-      <p:par>
-        <p:cTn id="1" dur="indefinite" restart="never" nodeType="tmRoot"/>
-      </p:par>
-    </p:tnLst>
-  </p:timing>
-</p:sld>
-</file>
-
 <file path=ppt/slides/slide19.xml><?xml version="1.0" encoding="utf-8"?>
 <p:sld xmlns:a="http://schemas.openxmlformats.org/drawingml/2006/main" xmlns:r="http://schemas.openxmlformats.org/officeDocument/2006/relationships" xmlns:p="http://schemas.openxmlformats.org/presentationml/2006/main">
   <p:cSld>
@@ -4402,7 +5394,7 @@
           <a:p>
             <a:r>
               <a:rPr lang="en-US" dirty="0" smtClean="0"/>
-              <a:t>Break Time!</a:t>
+              <a:t>Frameworks</a:t>
             </a:r>
             <a:endParaRPr lang="en-US" dirty="0"/>
           </a:p>
@@ -4420,39 +5412,123 @@
         </p:nvSpPr>
         <p:spPr/>
         <p:txBody>
+          <a:bodyPr>
+            <a:normAutofit fontScale="92500" lnSpcReduction="10000"/>
+          </a:bodyPr>
+          <a:lstStyle/>
+          <a:p>
+            <a:r>
+              <a:rPr lang="en-US" dirty="0" smtClean="0"/>
+              <a:t>A dozen or so popular frameworks.</a:t>
+            </a:r>
+          </a:p>
+          <a:p>
+            <a:r>
+              <a:rPr lang="en-US" dirty="0" smtClean="0"/>
+              <a:t>The correct choice is dependent </a:t>
+            </a:r>
+            <a:r>
+              <a:rPr lang="en-US" dirty="0" smtClean="0"/>
+              <a:t>on many variables:</a:t>
+            </a:r>
+          </a:p>
+          <a:p>
+            <a:pPr lvl="1"/>
+            <a:r>
+              <a:rPr lang="en-US" dirty="0"/>
+              <a:t>A</a:t>
+            </a:r>
+            <a:r>
+              <a:rPr lang="en-US" dirty="0" smtClean="0"/>
+              <a:t>pplication </a:t>
+            </a:r>
+            <a:r>
+              <a:rPr lang="en-US" dirty="0" smtClean="0"/>
+              <a:t>size </a:t>
+            </a:r>
+            <a:r>
+              <a:rPr lang="en-US" dirty="0" smtClean="0"/>
+              <a:t>and</a:t>
+            </a:r>
+            <a:r>
+              <a:rPr lang="en-US" dirty="0" smtClean="0"/>
+              <a:t> </a:t>
+            </a:r>
+            <a:r>
+              <a:rPr lang="en-US" dirty="0" smtClean="0"/>
+              <a:t>complexity</a:t>
+            </a:r>
+            <a:r>
+              <a:rPr lang="en-US" dirty="0" smtClean="0"/>
+              <a:t>.</a:t>
+            </a:r>
+          </a:p>
+          <a:p>
+            <a:pPr lvl="1"/>
+            <a:r>
+              <a:rPr lang="en-US" dirty="0" smtClean="0"/>
+              <a:t>Team experience.</a:t>
+            </a:r>
+            <a:endParaRPr lang="en-US" dirty="0" smtClean="0"/>
+          </a:p>
+          <a:p>
+            <a:r>
+              <a:rPr lang="en-US" dirty="0" smtClean="0"/>
+              <a:t>Backbone.js</a:t>
+            </a:r>
+          </a:p>
+          <a:p>
+            <a:pPr lvl="1"/>
+            <a:r>
+              <a:rPr lang="en-US" dirty="0" smtClean="0"/>
+              <a:t>Small</a:t>
+            </a:r>
+            <a:r>
+              <a:rPr lang="en-US" dirty="0" smtClean="0"/>
+              <a:t>, readable code base.</a:t>
+            </a:r>
+          </a:p>
+          <a:p>
+            <a:pPr lvl="1"/>
+            <a:r>
+              <a:rPr lang="en-US" dirty="0" smtClean="0"/>
+              <a:t>Add Marionette to go from library to framework.</a:t>
+            </a:r>
+          </a:p>
+          <a:p>
+            <a:pPr lvl="1"/>
+            <a:r>
+              <a:rPr lang="en-US" dirty="0" smtClean="0"/>
+              <a:t>Control your own architecture, while benefiting from some structure.</a:t>
+            </a:r>
+          </a:p>
+          <a:p>
+            <a:pPr lvl="1"/>
+            <a:endParaRPr lang="en-US" dirty="0" smtClean="0"/>
+          </a:p>
+          <a:p>
+            <a:endParaRPr lang="en-US" dirty="0"/>
+          </a:p>
+        </p:txBody>
+      </p:sp>
+      <p:sp>
+        <p:nvSpPr>
+          <p:cNvPr id="4" name="Text Placeholder 3"/>
+          <p:cNvSpPr>
+            <a:spLocks noGrp="1"/>
+          </p:cNvSpPr>
+          <p:nvPr>
+            <p:ph type="body" sz="quarter" idx="10"/>
+          </p:nvPr>
+        </p:nvSpPr>
+        <p:spPr/>
+        <p:txBody>
           <a:bodyPr/>
           <a:lstStyle/>
           <a:p>
             <a:r>
-              <a:rPr lang="en-US" dirty="0" err="1" smtClean="0"/>
-              <a:t>Ahhhhhh</a:t>
-            </a:r>
-            <a:r>
-              <a:rPr lang="en-US" dirty="0" smtClean="0"/>
-              <a:t>, intermission.</a:t>
-            </a:r>
-            <a:endParaRPr lang="en-US" dirty="0"/>
-          </a:p>
-        </p:txBody>
-      </p:sp>
-      <p:sp>
-        <p:nvSpPr>
-          <p:cNvPr id="4" name="Text Placeholder 3"/>
-          <p:cNvSpPr>
-            <a:spLocks noGrp="1"/>
-          </p:cNvSpPr>
-          <p:nvPr>
-            <p:ph type="body" sz="quarter" idx="10"/>
-          </p:nvPr>
-        </p:nvSpPr>
-        <p:spPr/>
-        <p:txBody>
-          <a:bodyPr/>
-          <a:lstStyle/>
-          <a:p>
-            <a:r>
-              <a:rPr lang="en-US" dirty="0" smtClean="0"/>
-              <a:t>A 15 minute break.	</a:t>
+              <a:rPr lang="en-US" dirty="0" smtClean="0"/>
+              <a:t>Conclusion</a:t>
             </a:r>
             <a:endParaRPr lang="en-US" dirty="0"/>
           </a:p>
@@ -4461,7 +5537,7 @@
     </p:spTree>
     <p:extLst>
       <p:ext uri="{BB962C8B-B14F-4D97-AF65-F5344CB8AC3E}">
-        <p14:creationId xmlns:p14="http://schemas.microsoft.com/office/powerpoint/2010/main" val="3301492455"/>
+        <p14:creationId xmlns:p14="http://schemas.microsoft.com/office/powerpoint/2010/main" val="1081390464"/>
       </p:ext>
     </p:extLst>
   </p:cSld>
@@ -4870,7 +5946,7 @@
           <a:p>
             <a:r>
               <a:rPr lang="en-US" dirty="0" smtClean="0"/>
-              <a:t>Session II</a:t>
+              <a:t>Sessions</a:t>
             </a:r>
             <a:endParaRPr lang="en-US" dirty="0"/>
           </a:p>
@@ -4894,6 +5970,13 @@
             <a:r>
               <a:rPr lang="en-US" dirty="0" smtClean="0"/>
               <a:t>We’ll return later!</a:t>
+            </a:r>
+          </a:p>
+          <a:p>
+            <a:pPr lvl="1"/>
+            <a:r>
+              <a:rPr lang="en-US" dirty="0" smtClean="0"/>
+              <a:t>Break time</a:t>
             </a:r>
           </a:p>
           <a:p>
@@ -4940,7 +6023,7 @@
     </p:spTree>
     <p:extLst>
       <p:ext uri="{BB962C8B-B14F-4D97-AF65-F5344CB8AC3E}">
-        <p14:creationId xmlns:p14="http://schemas.microsoft.com/office/powerpoint/2010/main" val="2483798309"/>
+        <p14:creationId xmlns:p14="http://schemas.microsoft.com/office/powerpoint/2010/main" val="4037308671"/>
       </p:ext>
     </p:extLst>
   </p:cSld>
@@ -4994,7 +6077,7 @@
           <a:p>
             <a:r>
               <a:rPr lang="en-US" dirty="0" smtClean="0"/>
-              <a:t>Advanced Topics</a:t>
+              <a:t>Break Time!</a:t>
             </a:r>
             <a:endParaRPr lang="en-US" dirty="0"/>
           </a:p>
@@ -5016,14 +6099,12 @@
           <a:lstStyle/>
           <a:p>
             <a:r>
-              <a:rPr lang="en-US" dirty="0" smtClean="0"/>
-              <a:t>Security Example</a:t>
-            </a:r>
-          </a:p>
-          <a:p>
-            <a:r>
-              <a:rPr lang="en-US" dirty="0" smtClean="0"/>
-              <a:t>Mobile Example</a:t>
+              <a:rPr lang="en-US" dirty="0" err="1" smtClean="0"/>
+              <a:t>Ahhhhhh</a:t>
+            </a:r>
+            <a:r>
+              <a:rPr lang="en-US" dirty="0" smtClean="0"/>
+              <a:t>, intermission.</a:t>
             </a:r>
             <a:endParaRPr lang="en-US" dirty="0"/>
           </a:p>
@@ -5046,7 +6127,7 @@
           <a:p>
             <a:r>
               <a:rPr lang="en-US" dirty="0" smtClean="0"/>
-              <a:t>Showing The Next Steps</a:t>
+              <a:t>A 15 minute break.	</a:t>
             </a:r>
             <a:endParaRPr lang="en-US" dirty="0"/>
           </a:p>
@@ -5055,7 +6136,7 @@
     </p:spTree>
     <p:extLst>
       <p:ext uri="{BB962C8B-B14F-4D97-AF65-F5344CB8AC3E}">
-        <p14:creationId xmlns:p14="http://schemas.microsoft.com/office/powerpoint/2010/main" val="3366267485"/>
+        <p14:creationId xmlns:p14="http://schemas.microsoft.com/office/powerpoint/2010/main" val="3301492455"/>
       </p:ext>
     </p:extLst>
   </p:cSld>
@@ -5109,6 +6190,245 @@
           <a:p>
             <a:r>
               <a:rPr lang="en-US" dirty="0" smtClean="0"/>
+              <a:t>Session II</a:t>
+            </a:r>
+            <a:endParaRPr lang="en-US" dirty="0"/>
+          </a:p>
+        </p:txBody>
+      </p:sp>
+      <p:sp>
+        <p:nvSpPr>
+          <p:cNvPr id="3" name="Content Placeholder 2"/>
+          <p:cNvSpPr>
+            <a:spLocks noGrp="1"/>
+          </p:cNvSpPr>
+          <p:nvPr>
+            <p:ph idx="1"/>
+          </p:nvPr>
+        </p:nvSpPr>
+        <p:spPr/>
+        <p:txBody>
+          <a:bodyPr/>
+          <a:lstStyle/>
+          <a:p>
+            <a:r>
+              <a:rPr lang="en-US" dirty="0" smtClean="0"/>
+              <a:t>We’ll return later!</a:t>
+            </a:r>
+          </a:p>
+          <a:p>
+            <a:pPr lvl="1"/>
+            <a:r>
+              <a:rPr lang="en-US" dirty="0" smtClean="0"/>
+              <a:t>Wrap-up.</a:t>
+            </a:r>
+          </a:p>
+          <a:p>
+            <a:pPr lvl="1"/>
+            <a:endParaRPr lang="en-US" dirty="0" smtClean="0"/>
+          </a:p>
+        </p:txBody>
+      </p:sp>
+      <p:sp>
+        <p:nvSpPr>
+          <p:cNvPr id="4" name="Text Placeholder 3"/>
+          <p:cNvSpPr>
+            <a:spLocks noGrp="1"/>
+          </p:cNvSpPr>
+          <p:nvPr>
+            <p:ph type="body" sz="quarter" idx="10"/>
+          </p:nvPr>
+        </p:nvSpPr>
+        <p:spPr>
+          <a:xfrm>
+            <a:off x="304800" y="711200"/>
+            <a:ext cx="6477000" cy="508000"/>
+          </a:xfrm>
+        </p:spPr>
+        <p:txBody>
+          <a:bodyPr/>
+          <a:lstStyle/>
+          <a:p>
+            <a:r>
+              <a:rPr lang="en-US" sz="2000" dirty="0" smtClean="0"/>
+              <a:t>Let’s start coding</a:t>
+            </a:r>
+            <a:endParaRPr lang="en-US" sz="2000" dirty="0"/>
+          </a:p>
+        </p:txBody>
+      </p:sp>
+    </p:spTree>
+    <p:extLst>
+      <p:ext uri="{BB962C8B-B14F-4D97-AF65-F5344CB8AC3E}">
+        <p14:creationId xmlns:p14="http://schemas.microsoft.com/office/powerpoint/2010/main" val="2483798309"/>
+      </p:ext>
+    </p:extLst>
+  </p:cSld>
+  <p:clrMapOvr>
+    <a:masterClrMapping/>
+  </p:clrMapOvr>
+  <p:transition spd="slow">
+    <p:push dir="u"/>
+  </p:transition>
+  <p:timing>
+    <p:tnLst>
+      <p:par>
+        <p:cTn id="1" dur="indefinite" restart="never" nodeType="tmRoot"/>
+      </p:par>
+    </p:tnLst>
+  </p:timing>
+</p:sld>
+</file>
+
+<file path=ppt/slides/slide23.xml><?xml version="1.0" encoding="utf-8"?>
+<p:sld xmlns:a="http://schemas.openxmlformats.org/drawingml/2006/main" xmlns:r="http://schemas.openxmlformats.org/officeDocument/2006/relationships" xmlns:p="http://schemas.openxmlformats.org/presentationml/2006/main">
+  <p:cSld>
+    <p:spTree>
+      <p:nvGrpSpPr>
+        <p:cNvPr id="1" name=""/>
+        <p:cNvGrpSpPr/>
+        <p:nvPr/>
+      </p:nvGrpSpPr>
+      <p:grpSpPr>
+        <a:xfrm>
+          <a:off x="0" y="0"/>
+          <a:ext cx="0" cy="0"/>
+          <a:chOff x="0" y="0"/>
+          <a:chExt cx="0" cy="0"/>
+        </a:xfrm>
+      </p:grpSpPr>
+      <p:sp>
+        <p:nvSpPr>
+          <p:cNvPr id="2" name="Title 1"/>
+          <p:cNvSpPr>
+            <a:spLocks noGrp="1"/>
+          </p:cNvSpPr>
+          <p:nvPr>
+            <p:ph type="title"/>
+          </p:nvPr>
+        </p:nvSpPr>
+        <p:spPr/>
+        <p:txBody>
+          <a:bodyPr/>
+          <a:lstStyle/>
+          <a:p>
+            <a:r>
+              <a:rPr lang="en-US" dirty="0" smtClean="0"/>
+              <a:t>Advanced Topics</a:t>
+            </a:r>
+            <a:endParaRPr lang="en-US" dirty="0"/>
+          </a:p>
+        </p:txBody>
+      </p:sp>
+      <p:sp>
+        <p:nvSpPr>
+          <p:cNvPr id="3" name="Content Placeholder 2"/>
+          <p:cNvSpPr>
+            <a:spLocks noGrp="1"/>
+          </p:cNvSpPr>
+          <p:nvPr>
+            <p:ph idx="1"/>
+          </p:nvPr>
+        </p:nvSpPr>
+        <p:spPr/>
+        <p:txBody>
+          <a:bodyPr/>
+          <a:lstStyle/>
+          <a:p>
+            <a:r>
+              <a:rPr lang="en-US" dirty="0" smtClean="0"/>
+              <a:t>Security Example</a:t>
+            </a:r>
+          </a:p>
+          <a:p>
+            <a:r>
+              <a:rPr lang="en-US" dirty="0" smtClean="0"/>
+              <a:t>Mobile Example</a:t>
+            </a:r>
+            <a:endParaRPr lang="en-US" dirty="0"/>
+          </a:p>
+        </p:txBody>
+      </p:sp>
+      <p:sp>
+        <p:nvSpPr>
+          <p:cNvPr id="4" name="Text Placeholder 3"/>
+          <p:cNvSpPr>
+            <a:spLocks noGrp="1"/>
+          </p:cNvSpPr>
+          <p:nvPr>
+            <p:ph type="body" sz="quarter" idx="10"/>
+          </p:nvPr>
+        </p:nvSpPr>
+        <p:spPr/>
+        <p:txBody>
+          <a:bodyPr/>
+          <a:lstStyle/>
+          <a:p>
+            <a:r>
+              <a:rPr lang="en-US" dirty="0" smtClean="0"/>
+              <a:t>Showing The Next Steps</a:t>
+            </a:r>
+            <a:endParaRPr lang="en-US" dirty="0"/>
+          </a:p>
+        </p:txBody>
+      </p:sp>
+    </p:spTree>
+    <p:extLst>
+      <p:ext uri="{BB962C8B-B14F-4D97-AF65-F5344CB8AC3E}">
+        <p14:creationId xmlns:p14="http://schemas.microsoft.com/office/powerpoint/2010/main" val="3366267485"/>
+      </p:ext>
+    </p:extLst>
+  </p:cSld>
+  <p:clrMapOvr>
+    <a:masterClrMapping/>
+  </p:clrMapOvr>
+  <p:transition spd="slow">
+    <p:push dir="u"/>
+  </p:transition>
+  <p:timing>
+    <p:tnLst>
+      <p:par>
+        <p:cTn id="1" dur="indefinite" restart="never" nodeType="tmRoot"/>
+      </p:par>
+    </p:tnLst>
+  </p:timing>
+</p:sld>
+</file>
+
+<file path=ppt/slides/slide24.xml><?xml version="1.0" encoding="utf-8"?>
+<p:sld xmlns:a="http://schemas.openxmlformats.org/drawingml/2006/main" xmlns:r="http://schemas.openxmlformats.org/officeDocument/2006/relationships" xmlns:p="http://schemas.openxmlformats.org/presentationml/2006/main">
+  <p:cSld>
+    <p:spTree>
+      <p:nvGrpSpPr>
+        <p:cNvPr id="1" name=""/>
+        <p:cNvGrpSpPr/>
+        <p:nvPr/>
+      </p:nvGrpSpPr>
+      <p:grpSpPr>
+        <a:xfrm>
+          <a:off x="0" y="0"/>
+          <a:ext cx="0" cy="0"/>
+          <a:chOff x="0" y="0"/>
+          <a:chExt cx="0" cy="0"/>
+        </a:xfrm>
+      </p:grpSpPr>
+      <p:sp>
+        <p:nvSpPr>
+          <p:cNvPr id="2" name="Title 1"/>
+          <p:cNvSpPr>
+            <a:spLocks noGrp="1"/>
+          </p:cNvSpPr>
+          <p:nvPr>
+            <p:ph type="title"/>
+          </p:nvPr>
+        </p:nvSpPr>
+        <p:spPr/>
+        <p:txBody>
+          <a:bodyPr/>
+          <a:lstStyle/>
+          <a:p>
+            <a:r>
+              <a:rPr lang="en-US" dirty="0" smtClean="0"/>
               <a:t>Q&amp;A Session</a:t>
             </a:r>
             <a:endParaRPr lang="en-US" dirty="0"/>
@@ -5183,7 +6503,7 @@
 </p:sld>
 </file>
 
-<file path=ppt/slides/slide23.xml><?xml version="1.0" encoding="utf-8"?>
+<file path=ppt/slides/slide25.xml><?xml version="1.0" encoding="utf-8"?>
 <p:sld xmlns:a="http://schemas.openxmlformats.org/drawingml/2006/main" xmlns:r="http://schemas.openxmlformats.org/officeDocument/2006/relationships" xmlns:p="http://schemas.openxmlformats.org/presentationml/2006/main">
   <p:cSld>
     <p:spTree>
@@ -5668,7 +6988,19 @@
           <a:p>
             <a:r>
               <a:rPr lang="en-US" dirty="0" smtClean="0"/>
-              <a:t>SPA Workshop</a:t>
+              <a:t>Why </a:t>
+            </a:r>
+            <a:r>
+              <a:rPr lang="en-US" dirty="0" smtClean="0"/>
+              <a:t>Are You</a:t>
+            </a:r>
+            <a:r>
+              <a:rPr lang="en-US" dirty="0" smtClean="0"/>
+              <a:t> Here</a:t>
+            </a:r>
+            <a:r>
+              <a:rPr lang="en-US" dirty="0" smtClean="0"/>
+              <a:t>?</a:t>
             </a:r>
             <a:endParaRPr lang="en-US" dirty="0"/>
           </a:p>
@@ -5684,95 +7016,45 @@
             <p:ph idx="1"/>
           </p:nvPr>
         </p:nvSpPr>
-        <p:spPr>
-          <a:xfrm>
-            <a:off x="457200" y="1524000"/>
-            <a:ext cx="8229600" cy="4449763"/>
-          </a:xfrm>
-        </p:spPr>
+        <p:spPr/>
         <p:txBody>
           <a:bodyPr>
-            <a:normAutofit fontScale="85000" lnSpcReduction="10000"/>
+            <a:normAutofit fontScale="92500" lnSpcReduction="10000"/>
           </a:bodyPr>
           <a:lstStyle/>
           <a:p>
             <a:r>
               <a:rPr lang="en-US" dirty="0" smtClean="0"/>
-              <a:t>Comparison: SPA vs. Traditional </a:t>
-            </a:r>
-            <a:r>
-              <a:rPr lang="en-US" dirty="0"/>
-              <a:t>W</a:t>
-            </a:r>
-            <a:r>
-              <a:rPr lang="en-US" dirty="0" smtClean="0"/>
-              <a:t>eb Apps.</a:t>
-            </a:r>
-          </a:p>
-          <a:p>
-            <a:r>
-              <a:rPr lang="en-US" dirty="0" smtClean="0"/>
-              <a:t>SPA </a:t>
-            </a:r>
-            <a:r>
-              <a:rPr lang="en-US" dirty="0"/>
-              <a:t>F</a:t>
-            </a:r>
-            <a:r>
-              <a:rPr lang="en-US" dirty="0" smtClean="0"/>
-              <a:t>ramework Tour.</a:t>
-            </a:r>
-          </a:p>
-          <a:p>
-            <a:r>
-              <a:rPr lang="en-US" i="1" dirty="0" smtClean="0"/>
-              <a:t>Before break sessions.</a:t>
-            </a:r>
-          </a:p>
-          <a:p>
-            <a:r>
-              <a:rPr lang="en-US" dirty="0" smtClean="0"/>
-              <a:t>We’ll take a 15 minute break.</a:t>
-            </a:r>
-          </a:p>
-          <a:p>
-            <a:r>
-              <a:rPr lang="en-US" i="1" dirty="0" smtClean="0"/>
-              <a:t>After break sessions.</a:t>
-            </a:r>
-          </a:p>
-          <a:p>
-            <a:r>
-              <a:rPr lang="en-US" dirty="0" smtClean="0"/>
-              <a:t>Advanced Topics Presentation.</a:t>
-            </a:r>
-          </a:p>
-          <a:p>
-            <a:pPr lvl="1"/>
-            <a:r>
-              <a:rPr lang="en-US" dirty="0" smtClean="0"/>
-              <a:t>Security and Mobile Devices</a:t>
-            </a:r>
-          </a:p>
-          <a:p>
-            <a:r>
-              <a:rPr lang="en-US" dirty="0" smtClean="0"/>
-              <a:t>Closing </a:t>
-            </a:r>
-          </a:p>
-          <a:p>
-            <a:pPr lvl="1"/>
-            <a:r>
-              <a:rPr lang="en-US" dirty="0" smtClean="0"/>
-              <a:t>Q&amp;A, Attendee Presentations.</a:t>
-            </a:r>
-          </a:p>
-          <a:p>
-            <a:r>
-              <a:rPr lang="en-US" dirty="0" smtClean="0"/>
-              <a:t>Links to resources and suggested reading.</a:t>
-            </a:r>
-            <a:endParaRPr lang="en-US" dirty="0"/>
+              <a:t>What is your experience level? Have you used any of this?</a:t>
+            </a:r>
+          </a:p>
+          <a:p>
+            <a:endParaRPr lang="en-US" dirty="0" smtClean="0"/>
+          </a:p>
+          <a:p>
+            <a:r>
+              <a:rPr lang="en-US" dirty="0" smtClean="0"/>
+              <a:t>What do you hope to learn?</a:t>
+            </a:r>
+          </a:p>
+          <a:p>
+            <a:endParaRPr lang="en-US" dirty="0" smtClean="0"/>
+          </a:p>
+          <a:p>
+            <a:r>
+              <a:rPr lang="en-US" dirty="0" smtClean="0"/>
+              <a:t>What are your leading concerns?</a:t>
+            </a:r>
+          </a:p>
+          <a:p>
+            <a:endParaRPr lang="en-US" dirty="0" smtClean="0"/>
+          </a:p>
+          <a:p>
+            <a:r>
+              <a:rPr lang="en-US" dirty="0" smtClean="0"/>
+              <a:t>Is there something important I should try to cover or mention?</a:t>
+            </a:r>
+            <a:endParaRPr lang="en-US" dirty="0" smtClean="0"/>
           </a:p>
         </p:txBody>
       </p:sp>
@@ -5793,7 +7075,7 @@
           <a:p>
             <a:r>
               <a:rPr lang="en-US" dirty="0" smtClean="0"/>
-              <a:t>Outline Of Activities</a:t>
+              <a:t>Goals and Scope</a:t>
             </a:r>
             <a:endParaRPr lang="en-US" dirty="0"/>
           </a:p>
@@ -5802,7 +7084,7 @@
     </p:spTree>
     <p:extLst>
       <p:ext uri="{BB962C8B-B14F-4D97-AF65-F5344CB8AC3E}">
-        <p14:creationId xmlns:p14="http://schemas.microsoft.com/office/powerpoint/2010/main" val="2510082476"/>
+        <p14:creationId xmlns:p14="http://schemas.microsoft.com/office/powerpoint/2010/main" val="2356149698"/>
       </p:ext>
     </p:extLst>
   </p:cSld>
@@ -5849,6 +7131,194 @@
             <p:ph type="title"/>
           </p:nvPr>
         </p:nvSpPr>
+        <p:spPr/>
+        <p:txBody>
+          <a:bodyPr/>
+          <a:lstStyle/>
+          <a:p>
+            <a:r>
+              <a:rPr lang="en-US" dirty="0" smtClean="0"/>
+              <a:t>SPA Workshop</a:t>
+            </a:r>
+            <a:endParaRPr lang="en-US" dirty="0"/>
+          </a:p>
+        </p:txBody>
+      </p:sp>
+      <p:sp>
+        <p:nvSpPr>
+          <p:cNvPr id="3" name="Content Placeholder 2"/>
+          <p:cNvSpPr>
+            <a:spLocks noGrp="1"/>
+          </p:cNvSpPr>
+          <p:nvPr>
+            <p:ph idx="1"/>
+          </p:nvPr>
+        </p:nvSpPr>
+        <p:spPr>
+          <a:xfrm>
+            <a:off x="457200" y="1524000"/>
+            <a:ext cx="8229600" cy="4449763"/>
+          </a:xfrm>
+        </p:spPr>
+        <p:txBody>
+          <a:bodyPr>
+            <a:normAutofit fontScale="85000" lnSpcReduction="10000"/>
+          </a:bodyPr>
+          <a:lstStyle/>
+          <a:p>
+            <a:r>
+              <a:rPr lang="en-US" dirty="0" smtClean="0"/>
+              <a:t>Comparison: SPA vs. Traditional </a:t>
+            </a:r>
+            <a:r>
+              <a:rPr lang="en-US" dirty="0"/>
+              <a:t>W</a:t>
+            </a:r>
+            <a:r>
+              <a:rPr lang="en-US" dirty="0" smtClean="0"/>
+              <a:t>eb Apps.</a:t>
+            </a:r>
+          </a:p>
+          <a:p>
+            <a:r>
+              <a:rPr lang="en-US" dirty="0" smtClean="0"/>
+              <a:t>SPA </a:t>
+            </a:r>
+            <a:r>
+              <a:rPr lang="en-US" dirty="0"/>
+              <a:t>F</a:t>
+            </a:r>
+            <a:r>
+              <a:rPr lang="en-US" dirty="0" smtClean="0"/>
+              <a:t>ramework Tour.</a:t>
+            </a:r>
+          </a:p>
+          <a:p>
+            <a:r>
+              <a:rPr lang="en-US" i="1" dirty="0" smtClean="0"/>
+              <a:t>Before break sessions.</a:t>
+            </a:r>
+          </a:p>
+          <a:p>
+            <a:r>
+              <a:rPr lang="en-US" dirty="0" smtClean="0"/>
+              <a:t>We’ll take a 15 minute break.</a:t>
+            </a:r>
+          </a:p>
+          <a:p>
+            <a:r>
+              <a:rPr lang="en-US" i="1" dirty="0" smtClean="0"/>
+              <a:t>After break sessions.</a:t>
+            </a:r>
+          </a:p>
+          <a:p>
+            <a:r>
+              <a:rPr lang="en-US" dirty="0" smtClean="0"/>
+              <a:t>Advanced Topics Presentation.</a:t>
+            </a:r>
+          </a:p>
+          <a:p>
+            <a:pPr lvl="1"/>
+            <a:r>
+              <a:rPr lang="en-US" dirty="0" smtClean="0"/>
+              <a:t>Security and Mobile Devices</a:t>
+            </a:r>
+          </a:p>
+          <a:p>
+            <a:r>
+              <a:rPr lang="en-US" dirty="0" smtClean="0"/>
+              <a:t>Closing </a:t>
+            </a:r>
+          </a:p>
+          <a:p>
+            <a:pPr lvl="1"/>
+            <a:r>
+              <a:rPr lang="en-US" dirty="0" smtClean="0"/>
+              <a:t>Q&amp;A, Attendee Presentations.</a:t>
+            </a:r>
+          </a:p>
+          <a:p>
+            <a:r>
+              <a:rPr lang="en-US" dirty="0" smtClean="0"/>
+              <a:t>Links to resources and suggested reading.</a:t>
+            </a:r>
+            <a:endParaRPr lang="en-US" dirty="0"/>
+          </a:p>
+        </p:txBody>
+      </p:sp>
+      <p:sp>
+        <p:nvSpPr>
+          <p:cNvPr id="4" name="Text Placeholder 3"/>
+          <p:cNvSpPr>
+            <a:spLocks noGrp="1"/>
+          </p:cNvSpPr>
+          <p:nvPr>
+            <p:ph type="body" sz="quarter" idx="10"/>
+          </p:nvPr>
+        </p:nvSpPr>
+        <p:spPr/>
+        <p:txBody>
+          <a:bodyPr/>
+          <a:lstStyle/>
+          <a:p>
+            <a:r>
+              <a:rPr lang="en-US" dirty="0" smtClean="0"/>
+              <a:t>Outline Of Activities</a:t>
+            </a:r>
+            <a:endParaRPr lang="en-US" dirty="0"/>
+          </a:p>
+        </p:txBody>
+      </p:sp>
+    </p:spTree>
+    <p:extLst>
+      <p:ext uri="{BB962C8B-B14F-4D97-AF65-F5344CB8AC3E}">
+        <p14:creationId xmlns:p14="http://schemas.microsoft.com/office/powerpoint/2010/main" val="2510082476"/>
+      </p:ext>
+    </p:extLst>
+  </p:cSld>
+  <p:clrMapOvr>
+    <a:masterClrMapping/>
+  </p:clrMapOvr>
+  <p:transition spd="slow">
+    <p:push dir="u"/>
+  </p:transition>
+  <p:timing>
+    <p:tnLst>
+      <p:par>
+        <p:cTn id="1" dur="indefinite" restart="never" nodeType="tmRoot"/>
+      </p:par>
+    </p:tnLst>
+  </p:timing>
+</p:sld>
+</file>
+
+<file path=ppt/slides/slide6.xml><?xml version="1.0" encoding="utf-8"?>
+<p:sld xmlns:a="http://schemas.openxmlformats.org/drawingml/2006/main" xmlns:r="http://schemas.openxmlformats.org/officeDocument/2006/relationships" xmlns:p="http://schemas.openxmlformats.org/presentationml/2006/main">
+  <p:cSld>
+    <p:spTree>
+      <p:nvGrpSpPr>
+        <p:cNvPr id="1" name=""/>
+        <p:cNvGrpSpPr/>
+        <p:nvPr/>
+      </p:nvGrpSpPr>
+      <p:grpSpPr>
+        <a:xfrm>
+          <a:off x="0" y="0"/>
+          <a:ext cx="0" cy="0"/>
+          <a:chOff x="0" y="0"/>
+          <a:chExt cx="0" cy="0"/>
+        </a:xfrm>
+      </p:grpSpPr>
+      <p:sp>
+        <p:nvSpPr>
+          <p:cNvPr id="2" name="Title 1"/>
+          <p:cNvSpPr>
+            <a:spLocks noGrp="1"/>
+          </p:cNvSpPr>
+          <p:nvPr>
+            <p:ph type="title"/>
+          </p:nvPr>
+        </p:nvSpPr>
         <p:spPr>
           <a:xfrm>
             <a:off x="304800" y="228600"/>
@@ -6038,7 +7508,186 @@
 </p:sld>
 </file>
 
-<file path=ppt/slides/slide6.xml><?xml version="1.0" encoding="utf-8"?>
+<file path=ppt/slides/slide7.xml><?xml version="1.0" encoding="utf-8"?>
+<p:sld xmlns:a="http://schemas.openxmlformats.org/drawingml/2006/main" xmlns:r="http://schemas.openxmlformats.org/officeDocument/2006/relationships" xmlns:p="http://schemas.openxmlformats.org/presentationml/2006/main">
+  <p:cSld>
+    <p:spTree>
+      <p:nvGrpSpPr>
+        <p:cNvPr id="1" name=""/>
+        <p:cNvGrpSpPr/>
+        <p:nvPr/>
+      </p:nvGrpSpPr>
+      <p:grpSpPr>
+        <a:xfrm>
+          <a:off x="0" y="0"/>
+          <a:ext cx="0" cy="0"/>
+          <a:chOff x="0" y="0"/>
+          <a:chExt cx="0" cy="0"/>
+        </a:xfrm>
+      </p:grpSpPr>
+      <p:sp>
+        <p:nvSpPr>
+          <p:cNvPr id="2" name="Title 1"/>
+          <p:cNvSpPr>
+            <a:spLocks noGrp="1"/>
+          </p:cNvSpPr>
+          <p:nvPr>
+            <p:ph type="title"/>
+          </p:nvPr>
+        </p:nvSpPr>
+        <p:spPr>
+          <a:xfrm>
+            <a:off x="304800" y="228600"/>
+            <a:ext cx="6324600" cy="571501"/>
+          </a:xfrm>
+        </p:spPr>
+        <p:txBody>
+          <a:bodyPr/>
+          <a:lstStyle/>
+          <a:p>
+            <a:r>
+              <a:rPr lang="en-US" dirty="0" smtClean="0"/>
+              <a:t>Framework VS Library</a:t>
+            </a:r>
+            <a:endParaRPr lang="en-US" dirty="0"/>
+          </a:p>
+        </p:txBody>
+      </p:sp>
+      <p:sp>
+        <p:nvSpPr>
+          <p:cNvPr id="3" name="Content Placeholder 2"/>
+          <p:cNvSpPr>
+            <a:spLocks noGrp="1"/>
+          </p:cNvSpPr>
+          <p:nvPr>
+            <p:ph idx="1"/>
+          </p:nvPr>
+        </p:nvSpPr>
+        <p:spPr/>
+        <p:txBody>
+          <a:bodyPr>
+            <a:normAutofit fontScale="85000" lnSpcReduction="10000"/>
+          </a:bodyPr>
+          <a:lstStyle/>
+          <a:p>
+            <a:r>
+              <a:rPr lang="en-US" dirty="0" smtClean="0"/>
+              <a:t>There are lots of definitions.</a:t>
+            </a:r>
+          </a:p>
+          <a:p>
+            <a:r>
+              <a:rPr lang="en-US" dirty="0" smtClean="0"/>
+              <a:t>A definition to guide us, but not the final word.</a:t>
+            </a:r>
+          </a:p>
+          <a:p>
+            <a:r>
+              <a:rPr lang="en-US" dirty="0" smtClean="0"/>
+              <a:t>From Martin Fowler:</a:t>
+            </a:r>
+          </a:p>
+          <a:p>
+            <a:pPr lvl="1"/>
+            <a:r>
+              <a:rPr lang="en-US" dirty="0"/>
+              <a:t>A </a:t>
+            </a:r>
+            <a:r>
+              <a:rPr lang="en-US" b="1" dirty="0"/>
+              <a:t>library</a:t>
+            </a:r>
+            <a:r>
+              <a:rPr lang="en-US" dirty="0"/>
+              <a:t> is essentially a set of functions that you can call, these days usually organized into classes. Each call does some work and returns control to the client</a:t>
+            </a:r>
+            <a:r>
+              <a:rPr lang="en-US" dirty="0" smtClean="0"/>
+              <a:t>.</a:t>
+            </a:r>
+          </a:p>
+          <a:p>
+            <a:pPr lvl="1"/>
+            <a:r>
+              <a:rPr lang="en-US" dirty="0"/>
+              <a:t>A </a:t>
+            </a:r>
+            <a:r>
+              <a:rPr lang="en-US" b="1" dirty="0"/>
+              <a:t>framework</a:t>
+            </a:r>
+            <a:r>
+              <a:rPr lang="en-US" dirty="0"/>
+              <a:t> embodies some abstract design, with more behavior built in. In order to use it you need to insert your behavior into various places in the framework either by </a:t>
+            </a:r>
+            <a:r>
+              <a:rPr lang="en-US" dirty="0" smtClean="0"/>
+              <a:t>sub-classing </a:t>
+            </a:r>
+            <a:r>
+              <a:rPr lang="en-US" dirty="0"/>
+              <a:t>or by plugging in your own classes. The framework's code then calls your code at these points</a:t>
+            </a:r>
+            <a:r>
+              <a:rPr lang="en-US" dirty="0" smtClean="0"/>
+              <a:t>.</a:t>
+            </a:r>
+            <a:endParaRPr lang="en-US" dirty="0" smtClean="0"/>
+          </a:p>
+        </p:txBody>
+      </p:sp>
+      <p:sp>
+        <p:nvSpPr>
+          <p:cNvPr id="4" name="Text Placeholder 3"/>
+          <p:cNvSpPr>
+            <a:spLocks noGrp="1"/>
+          </p:cNvSpPr>
+          <p:nvPr>
+            <p:ph type="body" sz="quarter" idx="10"/>
+          </p:nvPr>
+        </p:nvSpPr>
+        <p:spPr>
+          <a:xfrm>
+            <a:off x="304800" y="711200"/>
+            <a:ext cx="6477000" cy="508000"/>
+          </a:xfrm>
+        </p:spPr>
+        <p:txBody>
+          <a:bodyPr/>
+          <a:lstStyle/>
+          <a:p>
+            <a:r>
+              <a:rPr lang="en-US" sz="2000" dirty="0" smtClean="0"/>
+              <a:t>Defining the difference in our context.</a:t>
+            </a:r>
+            <a:endParaRPr lang="en-US" sz="2000" dirty="0"/>
+          </a:p>
+        </p:txBody>
+      </p:sp>
+    </p:spTree>
+    <p:extLst>
+      <p:ext uri="{BB962C8B-B14F-4D97-AF65-F5344CB8AC3E}">
+        <p14:creationId xmlns:p14="http://schemas.microsoft.com/office/powerpoint/2010/main" val="664901113"/>
+      </p:ext>
+    </p:extLst>
+  </p:cSld>
+  <p:clrMapOvr>
+    <a:masterClrMapping/>
+  </p:clrMapOvr>
+  <p:transition spd="slow">
+    <p:push dir="u"/>
+  </p:transition>
+  <p:timing>
+    <p:tnLst>
+      <p:par>
+        <p:cTn id="1" dur="indefinite" restart="never" nodeType="tmRoot"/>
+      </p:par>
+    </p:tnLst>
+  </p:timing>
+</p:sld>
+</file>
+
+<file path=ppt/slides/slide8.xml><?xml version="1.0" encoding="utf-8"?>
 <p:sld xmlns:a="http://schemas.openxmlformats.org/drawingml/2006/main" xmlns:r="http://schemas.openxmlformats.org/officeDocument/2006/relationships" xmlns:p="http://schemas.openxmlformats.org/presentationml/2006/main">
   <p:cSld>
     <p:spTree>
@@ -6292,7 +7941,7 @@
 </p:sld>
 </file>
 
-<file path=ppt/slides/slide7.xml><?xml version="1.0" encoding="utf-8"?>
+<file path=ppt/slides/slide9.xml><?xml version="1.0" encoding="utf-8"?>
 <p:sld xmlns:a="http://schemas.openxmlformats.org/drawingml/2006/main" xmlns:r="http://schemas.openxmlformats.org/officeDocument/2006/relationships" xmlns:p="http://schemas.openxmlformats.org/presentationml/2006/main">
   <p:cSld>
     <p:spTree>
@@ -6400,298 +8049,6 @@
     <p:extLst>
       <p:ext uri="{BB962C8B-B14F-4D97-AF65-F5344CB8AC3E}">
         <p14:creationId xmlns:p14="http://schemas.microsoft.com/office/powerpoint/2010/main" val="14186455"/>
-      </p:ext>
-    </p:extLst>
-  </p:cSld>
-  <p:clrMapOvr>
-    <a:masterClrMapping/>
-  </p:clrMapOvr>
-  <p:transition spd="slow">
-    <p:push dir="u"/>
-  </p:transition>
-  <p:timing>
-    <p:tnLst>
-      <p:par>
-        <p:cTn id="1" dur="indefinite" restart="never" nodeType="tmRoot"/>
-      </p:par>
-    </p:tnLst>
-  </p:timing>
-</p:sld>
-</file>
-
-<file path=ppt/slides/slide8.xml><?xml version="1.0" encoding="utf-8"?>
-<p:sld xmlns:a="http://schemas.openxmlformats.org/drawingml/2006/main" xmlns:r="http://schemas.openxmlformats.org/officeDocument/2006/relationships" xmlns:p="http://schemas.openxmlformats.org/presentationml/2006/main">
-  <p:cSld>
-    <p:spTree>
-      <p:nvGrpSpPr>
-        <p:cNvPr id="1" name=""/>
-        <p:cNvGrpSpPr/>
-        <p:nvPr/>
-      </p:nvGrpSpPr>
-      <p:grpSpPr>
-        <a:xfrm>
-          <a:off x="0" y="0"/>
-          <a:ext cx="0" cy="0"/>
-          <a:chOff x="0" y="0"/>
-          <a:chExt cx="0" cy="0"/>
-        </a:xfrm>
-      </p:grpSpPr>
-      <p:sp>
-        <p:nvSpPr>
-          <p:cNvPr id="2" name="Title 1"/>
-          <p:cNvSpPr>
-            <a:spLocks noGrp="1"/>
-          </p:cNvSpPr>
-          <p:nvPr>
-            <p:ph type="title"/>
-          </p:nvPr>
-        </p:nvSpPr>
-        <p:spPr/>
-        <p:txBody>
-          <a:bodyPr/>
-          <a:lstStyle/>
-          <a:p>
-            <a:r>
-              <a:rPr lang="en-US" dirty="0" smtClean="0"/>
-              <a:t>Frameworks</a:t>
-            </a:r>
-            <a:endParaRPr lang="en-US" dirty="0"/>
-          </a:p>
-        </p:txBody>
-      </p:sp>
-      <p:sp>
-        <p:nvSpPr>
-          <p:cNvPr id="3" name="Content Placeholder 2"/>
-          <p:cNvSpPr>
-            <a:spLocks noGrp="1"/>
-          </p:cNvSpPr>
-          <p:nvPr>
-            <p:ph idx="1"/>
-          </p:nvPr>
-        </p:nvSpPr>
-        <p:spPr>
-          <a:xfrm>
-            <a:off x="457200" y="1493837"/>
-            <a:ext cx="8229600" cy="4525963"/>
-          </a:xfrm>
-        </p:spPr>
-        <p:txBody>
-          <a:bodyPr/>
-          <a:lstStyle/>
-          <a:p>
-            <a:r>
-              <a:rPr lang="en-US" dirty="0" smtClean="0"/>
-              <a:t>Some Major Frameworks/Libraries</a:t>
-            </a:r>
-          </a:p>
-          <a:p>
-            <a:pPr lvl="1"/>
-            <a:r>
-              <a:rPr lang="en-US" dirty="0" smtClean="0"/>
-              <a:t>Angular</a:t>
-            </a:r>
-          </a:p>
-          <a:p>
-            <a:pPr lvl="1"/>
-            <a:r>
-              <a:rPr lang="en-US" dirty="0" smtClean="0"/>
-              <a:t>Backbone</a:t>
-            </a:r>
-          </a:p>
-          <a:p>
-            <a:pPr lvl="1"/>
-            <a:r>
-              <a:rPr lang="en-US" dirty="0" smtClean="0"/>
-              <a:t>Ember</a:t>
-            </a:r>
-          </a:p>
-          <a:p>
-            <a:pPr lvl="1"/>
-            <a:r>
-              <a:rPr lang="en-US" dirty="0" smtClean="0"/>
-              <a:t>Knockout</a:t>
-            </a:r>
-          </a:p>
-          <a:p>
-            <a:pPr lvl="1"/>
-            <a:r>
-              <a:rPr lang="en-US" dirty="0" smtClean="0"/>
-              <a:t>Others </a:t>
-            </a:r>
-            <a:r>
-              <a:rPr lang="en-US" sz="2000" dirty="0" smtClean="0"/>
-              <a:t>(</a:t>
-            </a:r>
-            <a:r>
-              <a:rPr lang="en-US" sz="2000" dirty="0" err="1" smtClean="0"/>
-              <a:t>CanJs,Meteor,MooTools,Ext</a:t>
-            </a:r>
-            <a:r>
-              <a:rPr lang="en-US" sz="2000" dirty="0" smtClean="0"/>
-              <a:t>)</a:t>
-            </a:r>
-            <a:endParaRPr lang="en-US" dirty="0" smtClean="0"/>
-          </a:p>
-          <a:p>
-            <a:r>
-              <a:rPr lang="en-US" dirty="0" smtClean="0"/>
-              <a:t>Size Vs. Power Vs. Complexity</a:t>
-            </a:r>
-          </a:p>
-          <a:p>
-            <a:r>
-              <a:rPr lang="en-US" dirty="0" smtClean="0"/>
-              <a:t>How much control do you want?</a:t>
-            </a:r>
-          </a:p>
-          <a:p>
-            <a:endParaRPr lang="en-US" dirty="0"/>
-          </a:p>
-        </p:txBody>
-      </p:sp>
-      <p:sp>
-        <p:nvSpPr>
-          <p:cNvPr id="4" name="Text Placeholder 3"/>
-          <p:cNvSpPr>
-            <a:spLocks noGrp="1"/>
-          </p:cNvSpPr>
-          <p:nvPr>
-            <p:ph type="body" sz="quarter" idx="10"/>
-          </p:nvPr>
-        </p:nvSpPr>
-        <p:spPr/>
-        <p:txBody>
-          <a:bodyPr/>
-          <a:lstStyle/>
-          <a:p>
-            <a:r>
-              <a:rPr lang="en-US" dirty="0" smtClean="0"/>
-              <a:t>A guided tour of the community.</a:t>
-            </a:r>
-            <a:endParaRPr lang="en-US" dirty="0"/>
-          </a:p>
-        </p:txBody>
-      </p:sp>
-    </p:spTree>
-    <p:extLst>
-      <p:ext uri="{BB962C8B-B14F-4D97-AF65-F5344CB8AC3E}">
-        <p14:creationId xmlns:p14="http://schemas.microsoft.com/office/powerpoint/2010/main" val="3999765243"/>
-      </p:ext>
-    </p:extLst>
-  </p:cSld>
-  <p:clrMapOvr>
-    <a:masterClrMapping/>
-  </p:clrMapOvr>
-  <p:transition spd="slow">
-    <p:push dir="u"/>
-  </p:transition>
-  <p:timing>
-    <p:tnLst>
-      <p:par>
-        <p:cTn id="1" dur="indefinite" restart="never" nodeType="tmRoot"/>
-      </p:par>
-    </p:tnLst>
-  </p:timing>
-</p:sld>
-</file>
-
-<file path=ppt/slides/slide9.xml><?xml version="1.0" encoding="utf-8"?>
-<p:sld xmlns:a="http://schemas.openxmlformats.org/drawingml/2006/main" xmlns:r="http://schemas.openxmlformats.org/officeDocument/2006/relationships" xmlns:p="http://schemas.openxmlformats.org/presentationml/2006/main">
-  <p:cSld>
-    <p:spTree>
-      <p:nvGrpSpPr>
-        <p:cNvPr id="1" name=""/>
-        <p:cNvGrpSpPr/>
-        <p:nvPr/>
-      </p:nvGrpSpPr>
-      <p:grpSpPr>
-        <a:xfrm>
-          <a:off x="0" y="0"/>
-          <a:ext cx="0" cy="0"/>
-          <a:chOff x="0" y="0"/>
-          <a:chExt cx="0" cy="0"/>
-        </a:xfrm>
-      </p:grpSpPr>
-      <p:sp>
-        <p:nvSpPr>
-          <p:cNvPr id="2" name="Title 1"/>
-          <p:cNvSpPr>
-            <a:spLocks noGrp="1"/>
-          </p:cNvSpPr>
-          <p:nvPr>
-            <p:ph type="title"/>
-          </p:nvPr>
-        </p:nvSpPr>
-        <p:spPr/>
-        <p:txBody>
-          <a:bodyPr/>
-          <a:lstStyle/>
-          <a:p>
-            <a:r>
-              <a:rPr lang="en-US" dirty="0" smtClean="0"/>
-              <a:t>Frameworks</a:t>
-            </a:r>
-            <a:endParaRPr lang="en-US" dirty="0"/>
-          </a:p>
-        </p:txBody>
-      </p:sp>
-      <p:sp>
-        <p:nvSpPr>
-          <p:cNvPr id="4" name="Text Placeholder 3"/>
-          <p:cNvSpPr>
-            <a:spLocks noGrp="1"/>
-          </p:cNvSpPr>
-          <p:nvPr>
-            <p:ph type="body" sz="quarter" idx="10"/>
-          </p:nvPr>
-        </p:nvSpPr>
-        <p:spPr>
-          <a:xfrm>
-            <a:off x="304800" y="711200"/>
-            <a:ext cx="5791200" cy="508000"/>
-          </a:xfrm>
-        </p:spPr>
-        <p:txBody>
-          <a:bodyPr/>
-          <a:lstStyle/>
-          <a:p>
-            <a:r>
-              <a:rPr lang="en-US" dirty="0" smtClean="0"/>
-              <a:t>A Market Share Survey</a:t>
-            </a:r>
-            <a:endParaRPr lang="en-US" dirty="0"/>
-          </a:p>
-        </p:txBody>
-      </p:sp>
-      <p:graphicFrame>
-        <p:nvGraphicFramePr>
-          <p:cNvPr id="8" name="Content Placeholder 7"/>
-          <p:cNvGraphicFramePr>
-            <a:graphicFrameLocks noGrp="1"/>
-          </p:cNvGraphicFramePr>
-          <p:nvPr>
-            <p:ph idx="1"/>
-            <p:extLst>
-              <p:ext uri="{D42A27DB-BD31-4B8C-83A1-F6EECF244321}">
-                <p14:modId xmlns:p14="http://schemas.microsoft.com/office/powerpoint/2010/main" val="1104780721"/>
-              </p:ext>
-            </p:extLst>
-          </p:nvPr>
-        </p:nvGraphicFramePr>
-        <p:xfrm>
-          <a:off x="152400" y="1295400"/>
-          <a:ext cx="8839200" cy="4953000"/>
-        </p:xfrm>
-        <a:graphic>
-          <a:graphicData uri="http://schemas.openxmlformats.org/drawingml/2006/chart">
-            <c:chart xmlns:c="http://schemas.openxmlformats.org/drawingml/2006/chart" xmlns:r="http://schemas.openxmlformats.org/officeDocument/2006/relationships" r:id="rId3"/>
-          </a:graphicData>
-        </a:graphic>
-      </p:graphicFrame>
-    </p:spTree>
-    <p:extLst>
-      <p:ext uri="{BB962C8B-B14F-4D97-AF65-F5344CB8AC3E}">
-        <p14:creationId xmlns:p14="http://schemas.microsoft.com/office/powerpoint/2010/main" val="2722999129"/>
       </p:ext>
     </p:extLst>
   </p:cSld>

</xml_diff>